<commit_message>
copyright header deleted and presentation updated
</commit_message>
<xml_diff>
--- a/presentation/Jahresprojekt Zwischenpräsentation.pptx
+++ b/presentation/Jahresprojekt Zwischenpräsentation.pptx
@@ -5,7 +5,7 @@
     <p:sldMasterId id="2147483648" r:id="rId1"/>
   </p:sldMasterIdLst>
   <p:notesMasterIdLst>
-    <p:notesMasterId r:id="rId19"/>
+    <p:notesMasterId r:id="rId21"/>
   </p:notesMasterIdLst>
   <p:sldIdLst>
     <p:sldId id="256" r:id="rId2"/>
@@ -19,12 +19,14 @@
     <p:sldId id="271" r:id="rId10"/>
     <p:sldId id="280" r:id="rId11"/>
     <p:sldId id="262" r:id="rId12"/>
-    <p:sldId id="270" r:id="rId13"/>
-    <p:sldId id="279" r:id="rId14"/>
-    <p:sldId id="277" r:id="rId15"/>
-    <p:sldId id="272" r:id="rId16"/>
-    <p:sldId id="274" r:id="rId17"/>
-    <p:sldId id="264" r:id="rId18"/>
+    <p:sldId id="281" r:id="rId13"/>
+    <p:sldId id="283" r:id="rId14"/>
+    <p:sldId id="270" r:id="rId15"/>
+    <p:sldId id="279" r:id="rId16"/>
+    <p:sldId id="277" r:id="rId17"/>
+    <p:sldId id="272" r:id="rId18"/>
+    <p:sldId id="274" r:id="rId19"/>
+    <p:sldId id="264" r:id="rId20"/>
   </p:sldIdLst>
   <p:sldSz cx="9144000" cy="6858000" type="screen4x3"/>
   <p:notesSz cx="6858000" cy="9144000"/>
@@ -2848,20 +2850,20 @@
   </dgm:ptLst>
   <dgm:cxnLst>
     <dgm:cxn modelId="{99AC8C85-3038-433F-9FF4-E7FBC269B650}" type="presOf" srcId="{EB4AF810-5F27-4424-953F-6E745857D154}" destId="{BCA768C0-63D7-47D8-A8BE-C28A109E6D5F}" srcOrd="1" destOrd="0" presId="urn:microsoft.com/office/officeart/2005/8/layout/matrix1"/>
+    <dgm:cxn modelId="{658114F4-81BF-4EDD-8380-5F7247E13437}" type="presOf" srcId="{A9390F88-A7A7-4C4D-89FF-1A78BBC8603B}" destId="{A5B61E79-E8F7-4B7A-B905-512B68224131}" srcOrd="0" destOrd="0" presId="urn:microsoft.com/office/officeart/2005/8/layout/matrix1"/>
+    <dgm:cxn modelId="{CA9A919A-66B6-4542-8228-D95EA9625F06}" srcId="{A6377181-3A36-4C51-A15D-4B7E94D00FA0}" destId="{1CDE512A-6BED-45E4-A160-0C3D6737D9F3}" srcOrd="0" destOrd="0" parTransId="{D2D956A1-F132-4E34-9C9F-D6B6A2CC28C6}" sibTransId="{0C71C6E2-B4A5-4BDC-8B9E-77BC354B0E92}"/>
+    <dgm:cxn modelId="{40777F0C-AFD2-4CCE-8AEA-864EECC35E15}" type="presOf" srcId="{EB4AF810-5F27-4424-953F-6E745857D154}" destId="{D2FE0942-737C-40CE-B352-72439F8F9C68}" srcOrd="0" destOrd="0" presId="urn:microsoft.com/office/officeart/2005/8/layout/matrix1"/>
     <dgm:cxn modelId="{23D60C62-1061-4D8C-A1D3-653B6F882282}" type="presOf" srcId="{1CDE512A-6BED-45E4-A160-0C3D6737D9F3}" destId="{9A1B30D4-02A5-4672-9C99-D97316359BFB}" srcOrd="1" destOrd="0" presId="urn:microsoft.com/office/officeart/2005/8/layout/matrix1"/>
+    <dgm:cxn modelId="{B23B4867-79B3-4075-8926-88BA0545E3D3}" srcId="{A9390F88-A7A7-4C4D-89FF-1A78BBC8603B}" destId="{A6377181-3A36-4C51-A15D-4B7E94D00FA0}" srcOrd="0" destOrd="0" parTransId="{84154685-CCE4-4874-9D3E-EC906AA33513}" sibTransId="{6834B7DA-C6E1-42C8-9CF6-DC8897E558A9}"/>
+    <dgm:cxn modelId="{AC54CCC5-8AA3-495E-8E0B-7B66AB2F1266}" srcId="{A6377181-3A36-4C51-A15D-4B7E94D00FA0}" destId="{EB4AF810-5F27-4424-953F-6E745857D154}" srcOrd="2" destOrd="0" parTransId="{6C3A6F00-ECE5-4EB5-9CFD-DE68753BA39C}" sibTransId="{AB52290C-57D2-4F92-96DC-FE8CF16B276C}"/>
+    <dgm:cxn modelId="{8D7CEFE0-90DB-4DCD-95CB-3BE1994B98A0}" type="presOf" srcId="{A6377181-3A36-4C51-A15D-4B7E94D00FA0}" destId="{96227F7B-7EDE-413C-8E0D-D3C68CB157D4}" srcOrd="0" destOrd="0" presId="urn:microsoft.com/office/officeart/2005/8/layout/matrix1"/>
+    <dgm:cxn modelId="{62EF817D-6AAE-4D48-A2D7-A18B025313B2}" type="presOf" srcId="{1237DFD6-0265-4E66-87D0-86B251C30F0D}" destId="{444C665F-3054-43A4-943C-EE857BB99496}" srcOrd="1" destOrd="0" presId="urn:microsoft.com/office/officeart/2005/8/layout/matrix1"/>
+    <dgm:cxn modelId="{45D4AB65-1C40-4572-AD23-59C006F8BBBE}" type="presOf" srcId="{1CDE512A-6BED-45E4-A160-0C3D6737D9F3}" destId="{80A4CC39-7938-4EBF-BDB4-2D9237597EDA}" srcOrd="0" destOrd="0" presId="urn:microsoft.com/office/officeart/2005/8/layout/matrix1"/>
     <dgm:cxn modelId="{156A6987-62C9-4821-9DCD-8227ECD93749}" type="presOf" srcId="{1237DFD6-0265-4E66-87D0-86B251C30F0D}" destId="{7C3AC0F8-C2A8-4D6A-B303-DFE85396908E}" srcOrd="0" destOrd="0" presId="urn:microsoft.com/office/officeart/2005/8/layout/matrix1"/>
-    <dgm:cxn modelId="{45D4AB65-1C40-4572-AD23-59C006F8BBBE}" type="presOf" srcId="{1CDE512A-6BED-45E4-A160-0C3D6737D9F3}" destId="{80A4CC39-7938-4EBF-BDB4-2D9237597EDA}" srcOrd="0" destOrd="0" presId="urn:microsoft.com/office/officeart/2005/8/layout/matrix1"/>
-    <dgm:cxn modelId="{8D7CEFE0-90DB-4DCD-95CB-3BE1994B98A0}" type="presOf" srcId="{A6377181-3A36-4C51-A15D-4B7E94D00FA0}" destId="{96227F7B-7EDE-413C-8E0D-D3C68CB157D4}" srcOrd="0" destOrd="0" presId="urn:microsoft.com/office/officeart/2005/8/layout/matrix1"/>
-    <dgm:cxn modelId="{B23B4867-79B3-4075-8926-88BA0545E3D3}" srcId="{A9390F88-A7A7-4C4D-89FF-1A78BBC8603B}" destId="{A6377181-3A36-4C51-A15D-4B7E94D00FA0}" srcOrd="0" destOrd="0" parTransId="{84154685-CCE4-4874-9D3E-EC906AA33513}" sibTransId="{6834B7DA-C6E1-42C8-9CF6-DC8897E558A9}"/>
-    <dgm:cxn modelId="{40777F0C-AFD2-4CCE-8AEA-864EECC35E15}" type="presOf" srcId="{EB4AF810-5F27-4424-953F-6E745857D154}" destId="{D2FE0942-737C-40CE-B352-72439F8F9C68}" srcOrd="0" destOrd="0" presId="urn:microsoft.com/office/officeart/2005/8/layout/matrix1"/>
     <dgm:cxn modelId="{CE1BFC2F-C272-401B-87E2-E05756A27B9C}" srcId="{A6377181-3A36-4C51-A15D-4B7E94D00FA0}" destId="{1237DFD6-0265-4E66-87D0-86B251C30F0D}" srcOrd="1" destOrd="0" parTransId="{AD44DB8C-9398-4284-9B8F-BC0BC0895AA2}" sibTransId="{4DCC079E-582B-4059-AB4A-415843641298}"/>
-    <dgm:cxn modelId="{CA9A919A-66B6-4542-8228-D95EA9625F06}" srcId="{A6377181-3A36-4C51-A15D-4B7E94D00FA0}" destId="{1CDE512A-6BED-45E4-A160-0C3D6737D9F3}" srcOrd="0" destOrd="0" parTransId="{D2D956A1-F132-4E34-9C9F-D6B6A2CC28C6}" sibTransId="{0C71C6E2-B4A5-4BDC-8B9E-77BC354B0E92}"/>
     <dgm:cxn modelId="{90BBF9A3-CC41-4939-A892-B7E889B2D478}" type="presOf" srcId="{30587BAF-AF05-4828-A149-C6184679BAE9}" destId="{D7398AA2-DA78-44BD-9312-E54896AB840C}" srcOrd="1" destOrd="0" presId="urn:microsoft.com/office/officeart/2005/8/layout/matrix1"/>
+    <dgm:cxn modelId="{0ED3363E-5D62-4312-A318-53C0BA116D01}" type="presOf" srcId="{30587BAF-AF05-4828-A149-C6184679BAE9}" destId="{09449C3A-45BE-414E-816E-DC2893A628A2}" srcOrd="0" destOrd="0" presId="urn:microsoft.com/office/officeart/2005/8/layout/matrix1"/>
     <dgm:cxn modelId="{9A0A9541-BA3C-420C-B1E6-43C3472B4448}" srcId="{A6377181-3A36-4C51-A15D-4B7E94D00FA0}" destId="{30587BAF-AF05-4828-A149-C6184679BAE9}" srcOrd="3" destOrd="0" parTransId="{0B723C7D-3193-45B3-B806-8F44C2C7ECAA}" sibTransId="{40355892-DDB1-4A68-9B6B-A685C949B489}"/>
-    <dgm:cxn modelId="{AC54CCC5-8AA3-495E-8E0B-7B66AB2F1266}" srcId="{A6377181-3A36-4C51-A15D-4B7E94D00FA0}" destId="{EB4AF810-5F27-4424-953F-6E745857D154}" srcOrd="2" destOrd="0" parTransId="{6C3A6F00-ECE5-4EB5-9CFD-DE68753BA39C}" sibTransId="{AB52290C-57D2-4F92-96DC-FE8CF16B276C}"/>
-    <dgm:cxn modelId="{62EF817D-6AAE-4D48-A2D7-A18B025313B2}" type="presOf" srcId="{1237DFD6-0265-4E66-87D0-86B251C30F0D}" destId="{444C665F-3054-43A4-943C-EE857BB99496}" srcOrd="1" destOrd="0" presId="urn:microsoft.com/office/officeart/2005/8/layout/matrix1"/>
-    <dgm:cxn modelId="{0ED3363E-5D62-4312-A318-53C0BA116D01}" type="presOf" srcId="{30587BAF-AF05-4828-A149-C6184679BAE9}" destId="{09449C3A-45BE-414E-816E-DC2893A628A2}" srcOrd="0" destOrd="0" presId="urn:microsoft.com/office/officeart/2005/8/layout/matrix1"/>
-    <dgm:cxn modelId="{658114F4-81BF-4EDD-8380-5F7247E13437}" type="presOf" srcId="{A9390F88-A7A7-4C4D-89FF-1A78BBC8603B}" destId="{A5B61E79-E8F7-4B7A-B905-512B68224131}" srcOrd="0" destOrd="0" presId="urn:microsoft.com/office/officeart/2005/8/layout/matrix1"/>
     <dgm:cxn modelId="{33EF4A35-0E69-4B32-9EBF-8E2DB3A4293B}" type="presParOf" srcId="{A5B61E79-E8F7-4B7A-B905-512B68224131}" destId="{CC4BDF31-B3C6-435B-A78E-ECD04F5785E6}" srcOrd="0" destOrd="0" presId="urn:microsoft.com/office/officeart/2005/8/layout/matrix1"/>
     <dgm:cxn modelId="{6C32DB93-BDC0-4087-B4FD-2F854223110E}" type="presParOf" srcId="{CC4BDF31-B3C6-435B-A78E-ECD04F5785E6}" destId="{80A4CC39-7938-4EBF-BDB4-2D9237597EDA}" srcOrd="0" destOrd="0" presId="urn:microsoft.com/office/officeart/2005/8/layout/matrix1"/>
     <dgm:cxn modelId="{CF6961DE-EAEB-4F9D-BDF0-8F1AA1D2B6AD}" type="presParOf" srcId="{CC4BDF31-B3C6-435B-A78E-ECD04F5785E6}" destId="{9A1B30D4-02A5-4672-9C99-D97316359BFB}" srcOrd="1" destOrd="0" presId="urn:microsoft.com/office/officeart/2005/8/layout/matrix1"/>
@@ -9648,7 +9650,7 @@
           <a:p>
             <a:fld id="{4299B327-2CE6-4272-AFAA-7494721F78A1}" type="datetimeFigureOut">
               <a:rPr lang="de-DE" smtClean="0"/>
-              <a:t>21.01.2014</a:t>
+              <a:t>22.01.2014</a:t>
             </a:fld>
             <a:endParaRPr lang="de-DE"/>
           </a:p>
@@ -10100,6 +10102,182 @@
 </p:notes>
 </file>
 
+<file path=ppt/notesSlides/notesSlide3.xml><?xml version="1.0" encoding="utf-8"?>
+<p:notes xmlns:a="http://schemas.openxmlformats.org/drawingml/2006/main" xmlns:r="http://schemas.openxmlformats.org/officeDocument/2006/relationships" xmlns:p="http://schemas.openxmlformats.org/presentationml/2006/main">
+  <p:cSld>
+    <p:spTree>
+      <p:nvGrpSpPr>
+        <p:cNvPr id="1" name=""/>
+        <p:cNvGrpSpPr/>
+        <p:nvPr/>
+      </p:nvGrpSpPr>
+      <p:grpSpPr>
+        <a:xfrm>
+          <a:off x="0" y="0"/>
+          <a:ext cx="0" cy="0"/>
+          <a:chOff x="0" y="0"/>
+          <a:chExt cx="0" cy="0"/>
+        </a:xfrm>
+      </p:grpSpPr>
+      <p:sp>
+        <p:nvSpPr>
+          <p:cNvPr id="2" name="Folienbildplatzhalter 1"/>
+          <p:cNvSpPr>
+            <a:spLocks noGrp="1" noRot="1" noChangeAspect="1"/>
+          </p:cNvSpPr>
+          <p:nvPr>
+            <p:ph type="sldImg"/>
+          </p:nvPr>
+        </p:nvSpPr>
+        <p:spPr/>
+      </p:sp>
+      <p:sp>
+        <p:nvSpPr>
+          <p:cNvPr id="3" name="Notizenplatzhalter 2"/>
+          <p:cNvSpPr>
+            <a:spLocks noGrp="1"/>
+          </p:cNvSpPr>
+          <p:nvPr>
+            <p:ph type="body" idx="1"/>
+          </p:nvPr>
+        </p:nvSpPr>
+        <p:spPr/>
+        <p:txBody>
+          <a:bodyPr/>
+          <a:lstStyle/>
+          <a:p>
+            <a:r>
+              <a:rPr lang="en-US" i="1" dirty="0" smtClean="0"/>
+              <a:t>A mojo is a Maven plain Old Java Object. Each mojo is an executable goal in Maven, and a plugin is a distribution of one or more related mojos.</a:t>
+            </a:r>
+            <a:endParaRPr lang="de-DE" dirty="0"/>
+          </a:p>
+        </p:txBody>
+      </p:sp>
+      <p:sp>
+        <p:nvSpPr>
+          <p:cNvPr id="4" name="Foliennummernplatzhalter 3"/>
+          <p:cNvSpPr>
+            <a:spLocks noGrp="1"/>
+          </p:cNvSpPr>
+          <p:nvPr>
+            <p:ph type="sldNum" sz="quarter" idx="10"/>
+          </p:nvPr>
+        </p:nvSpPr>
+        <p:spPr/>
+        <p:txBody>
+          <a:bodyPr/>
+          <a:lstStyle/>
+          <a:p>
+            <a:fld id="{D374CC15-B8E0-470E-9010-6A1D8115CB4D}" type="slidenum">
+              <a:rPr lang="de-DE" smtClean="0"/>
+              <a:t>12</a:t>
+            </a:fld>
+            <a:endParaRPr lang="de-DE"/>
+          </a:p>
+        </p:txBody>
+      </p:sp>
+    </p:spTree>
+    <p:extLst>
+      <p:ext uri="{BB962C8B-B14F-4D97-AF65-F5344CB8AC3E}">
+        <p14:creationId xmlns:p14="http://schemas.microsoft.com/office/powerpoint/2010/main" val="1429224159"/>
+      </p:ext>
+    </p:extLst>
+  </p:cSld>
+  <p:clrMapOvr>
+    <a:masterClrMapping/>
+  </p:clrMapOvr>
+</p:notes>
+</file>
+
+<file path=ppt/notesSlides/notesSlide4.xml><?xml version="1.0" encoding="utf-8"?>
+<p:notes xmlns:a="http://schemas.openxmlformats.org/drawingml/2006/main" xmlns:r="http://schemas.openxmlformats.org/officeDocument/2006/relationships" xmlns:p="http://schemas.openxmlformats.org/presentationml/2006/main">
+  <p:cSld>
+    <p:spTree>
+      <p:nvGrpSpPr>
+        <p:cNvPr id="1" name=""/>
+        <p:cNvGrpSpPr/>
+        <p:nvPr/>
+      </p:nvGrpSpPr>
+      <p:grpSpPr>
+        <a:xfrm>
+          <a:off x="0" y="0"/>
+          <a:ext cx="0" cy="0"/>
+          <a:chOff x="0" y="0"/>
+          <a:chExt cx="0" cy="0"/>
+        </a:xfrm>
+      </p:grpSpPr>
+      <p:sp>
+        <p:nvSpPr>
+          <p:cNvPr id="2" name="Folienbildplatzhalter 1"/>
+          <p:cNvSpPr>
+            <a:spLocks noGrp="1" noRot="1" noChangeAspect="1"/>
+          </p:cNvSpPr>
+          <p:nvPr>
+            <p:ph type="sldImg"/>
+          </p:nvPr>
+        </p:nvSpPr>
+        <p:spPr/>
+      </p:sp>
+      <p:sp>
+        <p:nvSpPr>
+          <p:cNvPr id="3" name="Notizenplatzhalter 2"/>
+          <p:cNvSpPr>
+            <a:spLocks noGrp="1"/>
+          </p:cNvSpPr>
+          <p:nvPr>
+            <p:ph type="body" idx="1"/>
+          </p:nvPr>
+        </p:nvSpPr>
+        <p:spPr/>
+        <p:txBody>
+          <a:bodyPr/>
+          <a:lstStyle/>
+          <a:p>
+            <a:r>
+              <a:rPr lang="en-US" i="1" dirty="0" smtClean="0"/>
+              <a:t>A mojo is a Maven plain Old Java Object. Each mojo is an executable goal in Maven, and a plugin is a distribution of one or more related mojos.</a:t>
+            </a:r>
+            <a:endParaRPr lang="de-DE" dirty="0"/>
+          </a:p>
+        </p:txBody>
+      </p:sp>
+      <p:sp>
+        <p:nvSpPr>
+          <p:cNvPr id="4" name="Foliennummernplatzhalter 3"/>
+          <p:cNvSpPr>
+            <a:spLocks noGrp="1"/>
+          </p:cNvSpPr>
+          <p:nvPr>
+            <p:ph type="sldNum" sz="quarter" idx="10"/>
+          </p:nvPr>
+        </p:nvSpPr>
+        <p:spPr/>
+        <p:txBody>
+          <a:bodyPr/>
+          <a:lstStyle/>
+          <a:p>
+            <a:fld id="{D374CC15-B8E0-470E-9010-6A1D8115CB4D}" type="slidenum">
+              <a:rPr lang="de-DE" smtClean="0"/>
+              <a:t>13</a:t>
+            </a:fld>
+            <a:endParaRPr lang="de-DE"/>
+          </a:p>
+        </p:txBody>
+      </p:sp>
+    </p:spTree>
+    <p:extLst>
+      <p:ext uri="{BB962C8B-B14F-4D97-AF65-F5344CB8AC3E}">
+        <p14:creationId xmlns:p14="http://schemas.microsoft.com/office/powerpoint/2010/main" val="1429224159"/>
+      </p:ext>
+    </p:extLst>
+  </p:cSld>
+  <p:clrMapOvr>
+    <a:masterClrMapping/>
+  </p:clrMapOvr>
+</p:notes>
+</file>
+
 <file path=ppt/slideLayouts/slideLayout1.xml><?xml version="1.0" encoding="utf-8"?>
 <p:sldLayout xmlns:a="http://schemas.openxmlformats.org/drawingml/2006/main" xmlns:r="http://schemas.openxmlformats.org/officeDocument/2006/relationships" xmlns:p="http://schemas.openxmlformats.org/presentationml/2006/main" type="title" preserve="1">
   <p:cSld name="Titelfolie">
@@ -10281,7 +10459,7 @@
           <a:p>
             <a:fld id="{29DD2713-24AB-4543-8F19-DC5B80EB3AA3}" type="datetime1">
               <a:rPr lang="de-DE" smtClean="0"/>
-              <a:t>21.01.2014</a:t>
+              <a:t>22.01.2014</a:t>
             </a:fld>
             <a:endParaRPr lang="de-DE" dirty="0"/>
           </a:p>
@@ -10462,7 +10640,7 @@
           <a:p>
             <a:fld id="{26F833BB-7093-4DAB-BCE3-65DF9AA20469}" type="datetime1">
               <a:rPr lang="de-DE" smtClean="0"/>
-              <a:t>21.01.2014</a:t>
+              <a:t>22.01.2014</a:t>
             </a:fld>
             <a:endParaRPr lang="de-DE"/>
           </a:p>
@@ -10646,7 +10824,7 @@
           <a:p>
             <a:fld id="{CBDE480B-24ED-4B4B-991F-1CE193275643}" type="datetime1">
               <a:rPr lang="de-DE" smtClean="0"/>
-              <a:t>21.01.2014</a:t>
+              <a:t>22.01.2014</a:t>
             </a:fld>
             <a:endParaRPr lang="de-DE"/>
           </a:p>
@@ -10820,7 +10998,7 @@
           <a:p>
             <a:fld id="{72C3D25D-0767-4F2C-9B99-7C455020BD2F}" type="datetime1">
               <a:rPr lang="de-DE" smtClean="0"/>
-              <a:t>21.01.2014</a:t>
+              <a:t>22.01.2014</a:t>
             </a:fld>
             <a:endParaRPr lang="de-DE"/>
           </a:p>
@@ -11273,7 +11451,7 @@
           <a:p>
             <a:fld id="{99EA7462-C25E-4796-813E-C5415848D56B}" type="datetime1">
               <a:rPr lang="de-DE" smtClean="0"/>
-              <a:t>21.01.2014</a:t>
+              <a:t>22.01.2014</a:t>
             </a:fld>
             <a:endParaRPr lang="de-DE"/>
           </a:p>
@@ -11565,7 +11743,7 @@
           <a:p>
             <a:fld id="{1E5B7C85-E8B4-4D5F-B261-0FA9E710857C}" type="datetime1">
               <a:rPr lang="de-DE" smtClean="0"/>
-              <a:t>21.01.2014</a:t>
+              <a:t>22.01.2014</a:t>
             </a:fld>
             <a:endParaRPr lang="de-DE"/>
           </a:p>
@@ -11991,7 +12169,7 @@
           <a:p>
             <a:fld id="{183CF53D-749F-4EF4-B1A9-A074892459C3}" type="datetime1">
               <a:rPr lang="de-DE" smtClean="0"/>
-              <a:t>21.01.2014</a:t>
+              <a:t>22.01.2014</a:t>
             </a:fld>
             <a:endParaRPr lang="de-DE"/>
           </a:p>
@@ -12113,7 +12291,7 @@
           <a:p>
             <a:fld id="{03EA49C7-9C8A-4E46-9147-B44984850B6D}" type="datetime1">
               <a:rPr lang="de-DE" smtClean="0"/>
-              <a:t>21.01.2014</a:t>
+              <a:t>22.01.2014</a:t>
             </a:fld>
             <a:endParaRPr lang="de-DE"/>
           </a:p>
@@ -12212,7 +12390,7 @@
           <a:p>
             <a:fld id="{C46473E6-DBD3-4EFE-8E7E-47AF7CC7253E}" type="datetime1">
               <a:rPr lang="de-DE" smtClean="0"/>
-              <a:t>21.01.2014</a:t>
+              <a:t>22.01.2014</a:t>
             </a:fld>
             <a:endParaRPr lang="de-DE"/>
           </a:p>
@@ -12493,7 +12671,7 @@
           <a:p>
             <a:fld id="{460B3C74-DBA5-4C6F-81DD-39286F5FCA60}" type="datetime1">
               <a:rPr lang="de-DE" smtClean="0"/>
-              <a:t>21.01.2014</a:t>
+              <a:t>22.01.2014</a:t>
             </a:fld>
             <a:endParaRPr lang="de-DE"/>
           </a:p>
@@ -12750,7 +12928,7 @@
           <a:p>
             <a:fld id="{471A0868-92D4-4FF9-A0E5-DAB61D0E3EC1}" type="datetime1">
               <a:rPr lang="de-DE" smtClean="0"/>
-              <a:t>21.01.2014</a:t>
+              <a:t>22.01.2014</a:t>
             </a:fld>
             <a:endParaRPr lang="de-DE"/>
           </a:p>
@@ -12967,7 +13145,7 @@
           <a:p>
             <a:fld id="{F29EB60B-DDB2-4174-A5B0-D89DAA85AC4A}" type="datetime1">
               <a:rPr lang="de-DE" smtClean="0"/>
-              <a:t>21.01.2014</a:t>
+              <a:t>22.01.2014</a:t>
             </a:fld>
             <a:endParaRPr lang="de-DE" dirty="0"/>
           </a:p>
@@ -14299,8 +14477,8 @@
         </p:nvSpPr>
         <p:spPr>
           <a:xfrm>
-            <a:off x="4211961" y="796642"/>
-            <a:ext cx="4680520" cy="400110"/>
+            <a:off x="2051720" y="796642"/>
+            <a:ext cx="6840761" cy="400110"/>
           </a:xfrm>
           <a:prstGeom prst="rect">
             <a:avLst/>
@@ -14326,7 +14504,19 @@
                 <a:latin typeface="Helvetica" panose="020B0604020202020204" pitchFamily="34" charset="0"/>
                 <a:cs typeface="Helvetica" panose="020B0604020202020204" pitchFamily="34" charset="0"/>
               </a:rPr>
-              <a:t>4. Einblick Umsetzung - Grundlagen</a:t>
+              <a:t>4. Einblick Umsetzung </a:t>
+            </a:r>
+            <a:r>
+              <a:rPr lang="de-DE" sz="2000" b="1" dirty="0" smtClean="0">
+                <a:solidFill>
+                  <a:schemeClr val="bg1">
+                    <a:lumMod val="65000"/>
+                  </a:schemeClr>
+                </a:solidFill>
+                <a:latin typeface="Helvetica" panose="020B0604020202020204" pitchFamily="34" charset="0"/>
+                <a:cs typeface="Helvetica" panose="020B0604020202020204" pitchFamily="34" charset="0"/>
+              </a:rPr>
+              <a:t>– Grundlagen Maven Plugin</a:t>
             </a:r>
             <a:endParaRPr lang="de-DE" sz="2000" b="1" dirty="0">
               <a:solidFill>
@@ -14348,8 +14538,8 @@
         </p:nvSpPr>
         <p:spPr>
           <a:xfrm>
-            <a:off x="894532" y="1648019"/>
-            <a:ext cx="7493892" cy="5632311"/>
+            <a:off x="539552" y="1648019"/>
+            <a:ext cx="7992888" cy="3416320"/>
           </a:xfrm>
           <a:prstGeom prst="rect">
             <a:avLst/>
@@ -14371,41 +14561,8 @@
                 <a:latin typeface="Helvetica" panose="020B0604020202020204" pitchFamily="34" charset="0"/>
                 <a:cs typeface="Helvetica" panose="020B0604020202020204" pitchFamily="34" charset="0"/>
               </a:rPr>
-              <a:t>Auflösen </a:t>
-            </a:r>
-            <a:r>
-              <a:rPr lang="de-DE" dirty="0">
-                <a:latin typeface="Helvetica" panose="020B0604020202020204" pitchFamily="34" charset="0"/>
-                <a:cs typeface="Helvetica" panose="020B0604020202020204" pitchFamily="34" charset="0"/>
-              </a:rPr>
-              <a:t>der Abhängigkeiten mit der </a:t>
-            </a:r>
-            <a:r>
-              <a:rPr lang="de-DE" dirty="0" err="1">
-                <a:latin typeface="Helvetica" panose="020B0604020202020204" pitchFamily="34" charset="0"/>
-                <a:cs typeface="Helvetica" panose="020B0604020202020204" pitchFamily="34" charset="0"/>
-              </a:rPr>
-              <a:t>Aether</a:t>
-            </a:r>
-            <a:r>
-              <a:rPr lang="de-DE" dirty="0">
-                <a:latin typeface="Helvetica" panose="020B0604020202020204" pitchFamily="34" charset="0"/>
-                <a:cs typeface="Helvetica" panose="020B0604020202020204" pitchFamily="34" charset="0"/>
-              </a:rPr>
-              <a:t>-Bibliothek von Eclipse</a:t>
-            </a:r>
-          </a:p>
-          <a:p>
-            <a:endParaRPr lang="de-DE" dirty="0">
-              <a:latin typeface="Helvetica" panose="020B0604020202020204" pitchFamily="34" charset="0"/>
-              <a:cs typeface="Helvetica" panose="020B0604020202020204" pitchFamily="34" charset="0"/>
-            </a:endParaRPr>
-          </a:p>
-          <a:p>
-            <a:endParaRPr lang="de-DE" dirty="0">
-              <a:latin typeface="Helvetica" panose="020B0604020202020204" pitchFamily="34" charset="0"/>
-              <a:cs typeface="Helvetica" panose="020B0604020202020204" pitchFamily="34" charset="0"/>
-            </a:endParaRPr>
+              <a:t>Eigentliche Funktionen von Maven bilden die einzelnen Plugins</a:t>
+            </a:r>
           </a:p>
           <a:p>
             <a:pPr marL="285750" indent="-285750">
@@ -14422,10 +14579,13 @@
               <a:buFont typeface="Arial" panose="020B0604020202020204" pitchFamily="34" charset="0"/>
               <a:buChar char="•"/>
             </a:pPr>
-            <a:endParaRPr lang="de-DE" dirty="0">
-              <a:latin typeface="Helvetica" panose="020B0604020202020204" pitchFamily="34" charset="0"/>
-              <a:cs typeface="Helvetica" panose="020B0604020202020204" pitchFamily="34" charset="0"/>
-            </a:endParaRPr>
+            <a:r>
+              <a:rPr lang="de-DE" dirty="0" smtClean="0">
+                <a:latin typeface="Helvetica" panose="020B0604020202020204" pitchFamily="34" charset="0"/>
+                <a:cs typeface="Helvetica" panose="020B0604020202020204" pitchFamily="34" charset="0"/>
+              </a:rPr>
+              <a:t>Plugins müssen nicht extra installiert werden, sondern werden bei Bedarf automatisch aus dem Repository heruntergeladen</a:t>
+            </a:r>
           </a:p>
           <a:p>
             <a:pPr marL="285750" indent="-285750">
@@ -14442,10 +14602,34 @@
               <a:buFont typeface="Arial" panose="020B0604020202020204" pitchFamily="34" charset="0"/>
               <a:buChar char="•"/>
             </a:pPr>
-            <a:endParaRPr lang="de-DE" dirty="0">
-              <a:latin typeface="Helvetica" panose="020B0604020202020204" pitchFamily="34" charset="0"/>
-              <a:cs typeface="Helvetica" panose="020B0604020202020204" pitchFamily="34" charset="0"/>
-            </a:endParaRPr>
+            <a:r>
+              <a:rPr lang="de-DE" dirty="0" err="1" smtClean="0">
+                <a:latin typeface="Helvetica" panose="020B0604020202020204" pitchFamily="34" charset="0"/>
+                <a:cs typeface="Helvetica" panose="020B0604020202020204" pitchFamily="34" charset="0"/>
+              </a:rPr>
+              <a:t>Pluginausführung</a:t>
+            </a:r>
+            <a:r>
+              <a:rPr lang="de-DE" dirty="0" smtClean="0">
+                <a:latin typeface="Helvetica" panose="020B0604020202020204" pitchFamily="34" charset="0"/>
+                <a:cs typeface="Helvetica" panose="020B0604020202020204" pitchFamily="34" charset="0"/>
+              </a:rPr>
+              <a:t> entweder durch Konfiguration in der POM oder direkt in der Kommandozeile durch </a:t>
+            </a:r>
+            <a:r>
+              <a:rPr lang="de-DE" dirty="0">
+                <a:latin typeface="Helvetica" panose="020B0604020202020204" pitchFamily="34" charset="0"/>
+                <a:cs typeface="Helvetica" panose="020B0604020202020204" pitchFamily="34" charset="0"/>
+              </a:rPr>
+              <a:t>E</a:t>
+            </a:r>
+            <a:r>
+              <a:rPr lang="de-DE" dirty="0" smtClean="0">
+                <a:latin typeface="Helvetica" panose="020B0604020202020204" pitchFamily="34" charset="0"/>
+                <a:cs typeface="Helvetica" panose="020B0604020202020204" pitchFamily="34" charset="0"/>
+              </a:rPr>
+              <a:t>ingabe von </a:t>
+            </a:r>
           </a:p>
           <a:p>
             <a:pPr marL="285750" indent="-285750">
@@ -14458,193 +14642,365 @@
             </a:endParaRPr>
           </a:p>
           <a:p>
+            <a:r>
+              <a:rPr lang="de-DE" dirty="0">
+                <a:latin typeface="Helvetica" panose="020B0604020202020204" pitchFamily="34" charset="0"/>
+                <a:cs typeface="Helvetica" panose="020B0604020202020204" pitchFamily="34" charset="0"/>
+              </a:rPr>
+              <a:t>	</a:t>
+            </a:r>
+            <a:r>
+              <a:rPr lang="de-DE" dirty="0" smtClean="0">
+                <a:latin typeface="Helvetica" panose="020B0604020202020204" pitchFamily="34" charset="0"/>
+                <a:cs typeface="Helvetica" panose="020B0604020202020204" pitchFamily="34" charset="0"/>
+              </a:rPr>
+              <a:t>	</a:t>
+            </a:r>
+            <a:r>
+              <a:rPr lang="de-DE" b="1" i="1" dirty="0" err="1" smtClean="0">
+                <a:latin typeface="Helvetica" panose="020B0604020202020204" pitchFamily="34" charset="0"/>
+                <a:cs typeface="Helvetica" panose="020B0604020202020204" pitchFamily="34" charset="0"/>
+              </a:rPr>
+              <a:t>mvn</a:t>
+            </a:r>
+            <a:r>
+              <a:rPr lang="de-DE" b="1" i="1" dirty="0" smtClean="0">
+                <a:latin typeface="Helvetica" panose="020B0604020202020204" pitchFamily="34" charset="0"/>
+                <a:cs typeface="Helvetica" panose="020B0604020202020204" pitchFamily="34" charset="0"/>
+              </a:rPr>
+              <a:t> </a:t>
+            </a:r>
+            <a:r>
+              <a:rPr lang="de-DE" b="1" i="1" dirty="0" err="1" smtClean="0">
+                <a:latin typeface="Helvetica" panose="020B0604020202020204" pitchFamily="34" charset="0"/>
+                <a:cs typeface="Helvetica" panose="020B0604020202020204" pitchFamily="34" charset="0"/>
+              </a:rPr>
+              <a:t>groupId:artifactId:version:goal</a:t>
+            </a:r>
+            <a:endParaRPr lang="de-DE" b="1" i="1" dirty="0" smtClean="0">
+              <a:latin typeface="Helvetica" panose="020B0604020202020204" pitchFamily="34" charset="0"/>
+              <a:cs typeface="Helvetica" panose="020B0604020202020204" pitchFamily="34" charset="0"/>
+            </a:endParaRPr>
+          </a:p>
+          <a:p>
+            <a:endParaRPr lang="de-DE" b="1" i="1" dirty="0">
+              <a:latin typeface="Helvetica" panose="020B0604020202020204" pitchFamily="34" charset="0"/>
+              <a:cs typeface="Helvetica" panose="020B0604020202020204" pitchFamily="34" charset="0"/>
+            </a:endParaRPr>
+          </a:p>
+          <a:p>
             <a:pPr marL="285750" indent="-285750">
               <a:buFont typeface="Arial" panose="020B0604020202020204" pitchFamily="34" charset="0"/>
               <a:buChar char="•"/>
             </a:pPr>
+            <a:r>
+              <a:rPr lang="de-DE" dirty="0" smtClean="0">
+                <a:latin typeface="Helvetica" panose="020B0604020202020204" pitchFamily="34" charset="0"/>
+                <a:cs typeface="Helvetica" panose="020B0604020202020204" pitchFamily="34" charset="0"/>
+              </a:rPr>
+              <a:t>Jedes Plugin besitzt sogenannte Goals, über welche die eigentlichen Funktionen eines Plugins aufgerufen werden (z.B. </a:t>
+            </a:r>
+            <a:r>
+              <a:rPr lang="de-DE" dirty="0" err="1" smtClean="0">
+                <a:latin typeface="Helvetica" panose="020B0604020202020204" pitchFamily="34" charset="0"/>
+                <a:cs typeface="Helvetica" panose="020B0604020202020204" pitchFamily="34" charset="0"/>
+              </a:rPr>
+              <a:t>mvn</a:t>
+            </a:r>
+            <a:r>
+              <a:rPr lang="de-DE" dirty="0" smtClean="0">
+                <a:latin typeface="Helvetica" panose="020B0604020202020204" pitchFamily="34" charset="0"/>
+                <a:cs typeface="Helvetica" panose="020B0604020202020204" pitchFamily="34" charset="0"/>
+              </a:rPr>
+              <a:t> </a:t>
+            </a:r>
+            <a:r>
+              <a:rPr lang="de-DE" dirty="0" err="1" smtClean="0">
+                <a:latin typeface="Helvetica" panose="020B0604020202020204" pitchFamily="34" charset="0"/>
+                <a:cs typeface="Helvetica" panose="020B0604020202020204" pitchFamily="34" charset="0"/>
+              </a:rPr>
+              <a:t>test</a:t>
+            </a:r>
+            <a:r>
+              <a:rPr lang="de-DE" dirty="0" smtClean="0">
+                <a:latin typeface="Helvetica" panose="020B0604020202020204" pitchFamily="34" charset="0"/>
+                <a:cs typeface="Helvetica" panose="020B0604020202020204" pitchFamily="34" charset="0"/>
+              </a:rPr>
+              <a:t>)</a:t>
+            </a:r>
             <a:endParaRPr lang="de-DE" dirty="0">
               <a:latin typeface="Helvetica" panose="020B0604020202020204" pitchFamily="34" charset="0"/>
               <a:cs typeface="Helvetica" panose="020B0604020202020204" pitchFamily="34" charset="0"/>
             </a:endParaRPr>
           </a:p>
-          <a:p>
-            <a:pPr marL="285750" indent="-285750">
-              <a:buFont typeface="Arial" panose="020B0604020202020204" pitchFamily="34" charset="0"/>
-              <a:buChar char="•"/>
-            </a:pPr>
-            <a:endParaRPr lang="de-DE" dirty="0" smtClean="0">
+        </p:txBody>
+      </p:sp>
+    </p:spTree>
+    <p:extLst>
+      <p:ext uri="{BB962C8B-B14F-4D97-AF65-F5344CB8AC3E}">
+        <p14:creationId xmlns:p14="http://schemas.microsoft.com/office/powerpoint/2010/main" val="606394329"/>
+      </p:ext>
+    </p:extLst>
+  </p:cSld>
+  <p:clrMapOvr>
+    <a:masterClrMapping/>
+  </p:clrMapOvr>
+  <p:timing>
+    <p:tnLst>
+      <p:par>
+        <p:cTn id="1" dur="indefinite" restart="never" nodeType="tmRoot"/>
+      </p:par>
+    </p:tnLst>
+  </p:timing>
+</p:sld>
+</file>
+
+<file path=ppt/slides/slide12.xml><?xml version="1.0" encoding="utf-8"?>
+<p:sld xmlns:a="http://schemas.openxmlformats.org/drawingml/2006/main" xmlns:r="http://schemas.openxmlformats.org/officeDocument/2006/relationships" xmlns:p="http://schemas.openxmlformats.org/presentationml/2006/main">
+  <p:cSld>
+    <p:spTree>
+      <p:nvGrpSpPr>
+        <p:cNvPr id="1" name=""/>
+        <p:cNvGrpSpPr/>
+        <p:nvPr/>
+      </p:nvGrpSpPr>
+      <p:grpSpPr>
+        <a:xfrm>
+          <a:off x="0" y="0"/>
+          <a:ext cx="0" cy="0"/>
+          <a:chOff x="0" y="0"/>
+          <a:chExt cx="0" cy="0"/>
+        </a:xfrm>
+      </p:grpSpPr>
+      <p:sp>
+        <p:nvSpPr>
+          <p:cNvPr id="63" name="Richtungspfeil 62"/>
+          <p:cNvSpPr/>
+          <p:nvPr/>
+        </p:nvSpPr>
+        <p:spPr>
+          <a:xfrm rot="5400000">
+            <a:off x="671834" y="4232823"/>
+            <a:ext cx="1054419" cy="1895046"/>
+          </a:xfrm>
+          <a:prstGeom prst="homePlate">
+            <a:avLst/>
+          </a:prstGeom>
+          <a:solidFill>
+            <a:srgbClr val="0088CC"/>
+          </a:solidFill>
+          <a:ln>
+            <a:noFill/>
+          </a:ln>
+        </p:spPr>
+        <p:style>
+          <a:lnRef idx="2">
+            <a:schemeClr val="accent1">
+              <a:shade val="50000"/>
+            </a:schemeClr>
+          </a:lnRef>
+          <a:fillRef idx="1">
+            <a:schemeClr val="accent1"/>
+          </a:fillRef>
+          <a:effectRef idx="0">
+            <a:schemeClr val="accent1"/>
+          </a:effectRef>
+          <a:fontRef idx="minor">
+            <a:schemeClr val="lt1"/>
+          </a:fontRef>
+        </p:style>
+        <p:txBody>
+          <a:bodyPr rtlCol="0" anchor="ctr"/>
+          <a:lstStyle/>
+          <a:p>
+            <a:pPr algn="ctr"/>
+            <a:endParaRPr lang="de-DE" dirty="0">
+              <a:solidFill>
+                <a:schemeClr val="tx1"/>
+              </a:solidFill>
+            </a:endParaRPr>
+          </a:p>
+        </p:txBody>
+      </p:sp>
+      <p:sp>
+        <p:nvSpPr>
+          <p:cNvPr id="4" name="Fußzeilenplatzhalter 3"/>
+          <p:cNvSpPr>
+            <a:spLocks noGrp="1"/>
+          </p:cNvSpPr>
+          <p:nvPr>
+            <p:ph type="ftr" sz="quarter" idx="11"/>
+          </p:nvPr>
+        </p:nvSpPr>
+        <p:spPr/>
+        <p:txBody>
+          <a:bodyPr/>
+          <a:lstStyle/>
+          <a:p>
+            <a:r>
+              <a:rPr lang="de-DE" smtClean="0"/>
+              <a:t>Michael Behr, Martin Kampa, Huina Zhu, Betreuer: Johannes Schneider</a:t>
+            </a:r>
+            <a:endParaRPr lang="de-DE"/>
+          </a:p>
+        </p:txBody>
+      </p:sp>
+      <p:sp>
+        <p:nvSpPr>
+          <p:cNvPr id="7" name="Foliennummernplatzhalter 6"/>
+          <p:cNvSpPr>
+            <a:spLocks noGrp="1"/>
+          </p:cNvSpPr>
+          <p:nvPr>
+            <p:ph type="sldNum" sz="quarter" idx="12"/>
+          </p:nvPr>
+        </p:nvSpPr>
+        <p:spPr/>
+        <p:txBody>
+          <a:bodyPr/>
+          <a:lstStyle/>
+          <a:p>
+            <a:fld id="{7FBB16D6-E964-4041-9FFF-CB6ECC1FFCE6}" type="slidenum">
+              <a:rPr lang="de-DE" smtClean="0"/>
+              <a:t>12</a:t>
+            </a:fld>
+            <a:endParaRPr lang="de-DE"/>
+          </a:p>
+        </p:txBody>
+      </p:sp>
+      <p:sp>
+        <p:nvSpPr>
+          <p:cNvPr id="13" name="Textfeld 12"/>
+          <p:cNvSpPr txBox="1"/>
+          <p:nvPr/>
+        </p:nvSpPr>
+        <p:spPr>
+          <a:xfrm>
+            <a:off x="607416" y="796642"/>
+            <a:ext cx="8285065" cy="400110"/>
+          </a:xfrm>
+          <a:prstGeom prst="rect">
+            <a:avLst/>
+          </a:prstGeom>
+          <a:solidFill>
+            <a:schemeClr val="bg1"/>
+          </a:solidFill>
+        </p:spPr>
+        <p:txBody>
+          <a:bodyPr wrap="square" rtlCol="0">
+            <a:spAutoFit/>
+          </a:bodyPr>
+          <a:lstStyle/>
+          <a:p>
+            <a:pPr algn="r"/>
+            <a:r>
+              <a:rPr lang="de-DE" sz="2000" b="1" dirty="0" smtClean="0">
+                <a:solidFill>
+                  <a:schemeClr val="bg1">
+                    <a:lumMod val="65000"/>
+                  </a:schemeClr>
+                </a:solidFill>
+                <a:latin typeface="Helvetica" panose="020B0604020202020204" pitchFamily="34" charset="0"/>
+                <a:cs typeface="Helvetica" panose="020B0604020202020204" pitchFamily="34" charset="0"/>
+              </a:rPr>
+              <a:t>4. Einblick Umsetzung </a:t>
+            </a:r>
+            <a:r>
+              <a:rPr lang="de-DE" sz="2000" b="1" dirty="0" smtClean="0">
+                <a:solidFill>
+                  <a:schemeClr val="bg1">
+                    <a:lumMod val="65000"/>
+                  </a:schemeClr>
+                </a:solidFill>
+                <a:latin typeface="Helvetica" panose="020B0604020202020204" pitchFamily="34" charset="0"/>
+                <a:cs typeface="Helvetica" panose="020B0604020202020204" pitchFamily="34" charset="0"/>
+              </a:rPr>
+              <a:t>– Grobes Vorgehen</a:t>
+            </a:r>
+            <a:endParaRPr lang="de-DE" sz="2000" b="1" dirty="0">
+              <a:solidFill>
+                <a:schemeClr val="bg1">
+                  <a:lumMod val="65000"/>
+                </a:schemeClr>
+              </a:solidFill>
               <a:latin typeface="Helvetica" panose="020B0604020202020204" pitchFamily="34" charset="0"/>
               <a:cs typeface="Helvetica" panose="020B0604020202020204" pitchFamily="34" charset="0"/>
             </a:endParaRPr>
           </a:p>
-          <a:p>
-            <a:pPr marL="285750" indent="-285750">
-              <a:buFont typeface="Arial" panose="020B0604020202020204" pitchFamily="34" charset="0"/>
-              <a:buChar char="•"/>
-            </a:pPr>
-            <a:r>
-              <a:rPr lang="de-DE" dirty="0" smtClean="0">
-                <a:latin typeface="Helvetica" panose="020B0604020202020204" pitchFamily="34" charset="0"/>
-                <a:cs typeface="Helvetica" panose="020B0604020202020204" pitchFamily="34" charset="0"/>
-              </a:rPr>
-              <a:t>Maven APIs für den Zugriff auf aktuelles Projekt und zum Erstellen der </a:t>
-            </a:r>
-            <a:r>
-              <a:rPr lang="de-DE" dirty="0" err="1" smtClean="0">
-                <a:latin typeface="Helvetica" panose="020B0604020202020204" pitchFamily="34" charset="0"/>
-                <a:cs typeface="Helvetica" panose="020B0604020202020204" pitchFamily="34" charset="0"/>
-              </a:rPr>
-              <a:t>Mojos</a:t>
-            </a:r>
-            <a:r>
-              <a:rPr lang="de-DE" dirty="0" smtClean="0">
-                <a:latin typeface="Helvetica" panose="020B0604020202020204" pitchFamily="34" charset="0"/>
-                <a:cs typeface="Helvetica" panose="020B0604020202020204" pitchFamily="34" charset="0"/>
-              </a:rPr>
-              <a:t> (</a:t>
-            </a:r>
-            <a:r>
-              <a:rPr lang="en-US" dirty="0">
-                <a:latin typeface="Helvetica" panose="020B0604020202020204" pitchFamily="34" charset="0"/>
-                <a:cs typeface="Helvetica" panose="020B0604020202020204" pitchFamily="34" charset="0"/>
-              </a:rPr>
-              <a:t>Maven plain Old Java Object</a:t>
-            </a:r>
-            <a:r>
-              <a:rPr lang="de-DE" dirty="0" smtClean="0">
-                <a:latin typeface="Helvetica" panose="020B0604020202020204" pitchFamily="34" charset="0"/>
-                <a:cs typeface="Helvetica" panose="020B0604020202020204" pitchFamily="34" charset="0"/>
-              </a:rPr>
-              <a:t>) / Goals</a:t>
-            </a:r>
-          </a:p>
-          <a:p>
-            <a:pPr marL="285750" indent="-285750">
-              <a:buFont typeface="Arial" panose="020B0604020202020204" pitchFamily="34" charset="0"/>
-              <a:buChar char="•"/>
-            </a:pPr>
-            <a:endParaRPr lang="de-DE" dirty="0">
-              <a:latin typeface="Helvetica" panose="020B0604020202020204" pitchFamily="34" charset="0"/>
-              <a:cs typeface="Helvetica" panose="020B0604020202020204" pitchFamily="34" charset="0"/>
+        </p:txBody>
+      </p:sp>
+      <p:sp>
+        <p:nvSpPr>
+          <p:cNvPr id="27" name="Textfeld 26"/>
+          <p:cNvSpPr txBox="1"/>
+          <p:nvPr/>
+        </p:nvSpPr>
+        <p:spPr>
+          <a:xfrm>
+            <a:off x="251520" y="2511946"/>
+            <a:ext cx="1895046" cy="461665"/>
+          </a:xfrm>
+          <a:prstGeom prst="rect">
+            <a:avLst/>
+          </a:prstGeom>
+          <a:noFill/>
+        </p:spPr>
+        <p:txBody>
+          <a:bodyPr wrap="square" rtlCol="0">
+            <a:spAutoFit/>
+          </a:bodyPr>
+          <a:lstStyle/>
+          <a:p>
+            <a:pPr algn="ctr"/>
+            <a:r>
+              <a:rPr lang="de-DE" sz="1200" b="1" dirty="0" smtClean="0">
+                <a:solidFill>
+                  <a:srgbClr val="0088CC"/>
+                </a:solidFill>
+              </a:rPr>
+              <a:t>Graph bestehend aus </a:t>
+            </a:r>
+            <a:r>
+              <a:rPr lang="de-DE" sz="1200" b="1" dirty="0" err="1" smtClean="0">
+                <a:solidFill>
+                  <a:srgbClr val="0088CC"/>
+                </a:solidFill>
+              </a:rPr>
+              <a:t>Dependency</a:t>
+            </a:r>
+            <a:r>
+              <a:rPr lang="de-DE" sz="1200" b="1" dirty="0" smtClean="0">
+                <a:solidFill>
+                  <a:srgbClr val="0088CC"/>
+                </a:solidFill>
+              </a:rPr>
+              <a:t>-Nodes</a:t>
+            </a:r>
+            <a:endParaRPr lang="de-DE" sz="1200" b="1" dirty="0">
+              <a:solidFill>
+                <a:srgbClr val="0088CC"/>
+              </a:solidFill>
             </a:endParaRPr>
-          </a:p>
-          <a:p>
-            <a:pPr marL="285750" indent="-285750">
-              <a:buFont typeface="Arial" panose="020B0604020202020204" pitchFamily="34" charset="0"/>
-              <a:buChar char="•"/>
-            </a:pPr>
-            <a:r>
-              <a:rPr lang="de-DE" dirty="0" smtClean="0">
-                <a:latin typeface="Helvetica" panose="020B0604020202020204" pitchFamily="34" charset="0"/>
-                <a:cs typeface="Helvetica" panose="020B0604020202020204" pitchFamily="34" charset="0"/>
-              </a:rPr>
-              <a:t>Ein Plugin mit verschiedenen Goals</a:t>
-            </a:r>
-            <a:r>
-              <a:rPr lang="de-DE" dirty="0" smtClean="0">
-                <a:latin typeface="Helvetica" panose="020B0604020202020204" pitchFamily="34" charset="0"/>
-                <a:cs typeface="Helvetica" panose="020B0604020202020204" pitchFamily="34" charset="0"/>
-              </a:rPr>
-              <a:t>…</a:t>
-            </a:r>
-          </a:p>
-          <a:p>
-            <a:pPr marL="285750" indent="-285750">
-              <a:buFont typeface="Arial" panose="020B0604020202020204" pitchFamily="34" charset="0"/>
-              <a:buChar char="•"/>
-            </a:pPr>
-            <a:r>
-              <a:rPr lang="de-DE" dirty="0" smtClean="0">
-                <a:latin typeface="Helvetica" panose="020B0604020202020204" pitchFamily="34" charset="0"/>
-                <a:cs typeface="Helvetica" panose="020B0604020202020204" pitchFamily="34" charset="0"/>
-              </a:rPr>
-              <a:t>Wie erstellt man allgemein ein </a:t>
-            </a:r>
-            <a:r>
-              <a:rPr lang="de-DE" dirty="0" err="1" smtClean="0">
-                <a:latin typeface="Helvetica" panose="020B0604020202020204" pitchFamily="34" charset="0"/>
-                <a:cs typeface="Helvetica" panose="020B0604020202020204" pitchFamily="34" charset="0"/>
-              </a:rPr>
-              <a:t>maven</a:t>
-            </a:r>
-            <a:r>
-              <a:rPr lang="de-DE" dirty="0" smtClean="0">
-                <a:latin typeface="Helvetica" panose="020B0604020202020204" pitchFamily="34" charset="0"/>
-                <a:cs typeface="Helvetica" panose="020B0604020202020204" pitchFamily="34" charset="0"/>
-              </a:rPr>
-              <a:t> </a:t>
-            </a:r>
-            <a:r>
-              <a:rPr lang="de-DE" dirty="0" err="1" smtClean="0">
-                <a:latin typeface="Helvetica" panose="020B0604020202020204" pitchFamily="34" charset="0"/>
-                <a:cs typeface="Helvetica" panose="020B0604020202020204" pitchFamily="34" charset="0"/>
-              </a:rPr>
-              <a:t>plugin</a:t>
-            </a:r>
-            <a:r>
-              <a:rPr lang="de-DE" dirty="0" smtClean="0">
-                <a:latin typeface="Helvetica" panose="020B0604020202020204" pitchFamily="34" charset="0"/>
-                <a:cs typeface="Helvetica" panose="020B0604020202020204" pitchFamily="34" charset="0"/>
-              </a:rPr>
-              <a:t> ??</a:t>
-            </a:r>
-            <a:endParaRPr lang="de-DE" dirty="0" smtClean="0">
-              <a:latin typeface="Helvetica" panose="020B0604020202020204" pitchFamily="34" charset="0"/>
-              <a:cs typeface="Helvetica" panose="020B0604020202020204" pitchFamily="34" charset="0"/>
-            </a:endParaRPr>
-          </a:p>
-          <a:p>
-            <a:pPr marL="285750" indent="-285750">
-              <a:buFont typeface="Arial" panose="020B0604020202020204" pitchFamily="34" charset="0"/>
-              <a:buChar char="•"/>
-            </a:pPr>
-            <a:r>
-              <a:rPr lang="de-DE" dirty="0" err="1" smtClean="0">
-                <a:latin typeface="Helvetica" panose="020B0604020202020204" pitchFamily="34" charset="0"/>
-                <a:cs typeface="Helvetica" panose="020B0604020202020204" pitchFamily="34" charset="0"/>
-              </a:rPr>
-              <a:t>Clash</a:t>
-            </a:r>
-            <a:r>
-              <a:rPr lang="de-DE" dirty="0" smtClean="0">
-                <a:latin typeface="Helvetica" panose="020B0604020202020204" pitchFamily="34" charset="0"/>
-                <a:cs typeface="Helvetica" panose="020B0604020202020204" pitchFamily="34" charset="0"/>
-              </a:rPr>
-              <a:t> tritt auf sobald eine Abhängigkeit auf ein Projekt mehrmals vorkommt</a:t>
-            </a:r>
-          </a:p>
-          <a:p>
-            <a:pPr marL="285750" indent="-285750">
-              <a:buFont typeface="Arial" panose="020B0604020202020204" pitchFamily="34" charset="0"/>
-              <a:buChar char="•"/>
-            </a:pPr>
-            <a:endParaRPr lang="de-DE" dirty="0"/>
-          </a:p>
-          <a:p>
-            <a:endParaRPr lang="de-DE" dirty="0" smtClean="0"/>
-          </a:p>
-          <a:p>
-            <a:endParaRPr lang="de-DE" dirty="0" smtClean="0"/>
           </a:p>
         </p:txBody>
       </p:sp>
       <p:grpSp>
         <p:nvGrpSpPr>
-          <p:cNvPr id="10" name="Gruppieren 9"/>
+          <p:cNvPr id="31" name="Gruppieren 30"/>
           <p:cNvGrpSpPr/>
           <p:nvPr/>
         </p:nvGrpSpPr>
         <p:grpSpPr>
           <a:xfrm>
-            <a:off x="3190803" y="2203306"/>
-            <a:ext cx="718324" cy="1087606"/>
+            <a:off x="5753632" y="1875791"/>
+            <a:ext cx="552064" cy="761121"/>
             <a:chOff x="6055444" y="2636912"/>
             <a:chExt cx="718324" cy="1087606"/>
           </a:xfrm>
         </p:grpSpPr>
         <p:sp>
           <p:nvSpPr>
-            <p:cNvPr id="8" name="Eine Ecke des Rechtecks schneiden 7"/>
+            <p:cNvPr id="33" name="Eine Ecke des Rechtecks schneiden 32"/>
             <p:cNvSpPr/>
             <p:nvPr/>
           </p:nvSpPr>
@@ -14687,61 +15043,43 @@
             <a:p>
               <a:pPr algn="ctr"/>
               <a:r>
-                <a:rPr lang="de-DE" sz="700" dirty="0"/>
+                <a:rPr lang="de-DE" sz="500" dirty="0"/>
                 <a:t>&lt;</a:t>
               </a:r>
               <a:r>
-                <a:rPr lang="de-DE" sz="700" dirty="0" err="1"/>
+                <a:rPr lang="de-DE" sz="500" dirty="0" err="1"/>
                 <a:t>dependency</a:t>
               </a:r>
               <a:r>
-                <a:rPr lang="de-DE" sz="700" dirty="0"/>
+                <a:rPr lang="de-DE" sz="500" dirty="0"/>
                 <a:t>&gt;</a:t>
               </a:r>
             </a:p>
             <a:p>
               <a:pPr algn="ctr"/>
-              <a:endParaRPr lang="de-DE" sz="700" dirty="0"/>
+              <a:endParaRPr lang="de-DE" sz="500" dirty="0"/>
             </a:p>
             <a:p>
               <a:pPr algn="ctr"/>
               <a:r>
-                <a:rPr lang="de-DE" sz="700" dirty="0"/>
+                <a:rPr lang="de-DE" sz="500" dirty="0"/>
                 <a:t>&lt;</a:t>
               </a:r>
               <a:r>
-                <a:rPr lang="de-DE" sz="700" dirty="0" err="1" smtClean="0"/>
+                <a:rPr lang="de-DE" sz="500" dirty="0" err="1" smtClean="0"/>
                 <a:t>dependency</a:t>
               </a:r>
               <a:r>
-                <a:rPr lang="de-DE" sz="700" dirty="0"/>
+                <a:rPr lang="de-DE" sz="500" dirty="0" smtClean="0"/>
                 <a:t>&gt;</a:t>
               </a:r>
-            </a:p>
-            <a:p>
-              <a:pPr algn="ctr"/>
-              <a:endParaRPr lang="de-DE" sz="700" dirty="0"/>
-            </a:p>
-            <a:p>
-              <a:pPr algn="ctr"/>
-              <a:r>
-                <a:rPr lang="de-DE" sz="700" dirty="0"/>
-                <a:t>&lt;</a:t>
-              </a:r>
-              <a:r>
-                <a:rPr lang="de-DE" sz="700" dirty="0" err="1"/>
-                <a:t>dependency</a:t>
-              </a:r>
-              <a:r>
-                <a:rPr lang="de-DE" sz="700" dirty="0"/>
-                <a:t>&gt;</a:t>
-              </a:r>
+              <a:endParaRPr lang="de-DE" sz="500" dirty="0"/>
             </a:p>
           </p:txBody>
         </p:sp>
         <p:sp>
           <p:nvSpPr>
-            <p:cNvPr id="6" name="Rechtwinkliges Dreieck 5"/>
+            <p:cNvPr id="34" name="Rechtwinkliges Dreieck 33"/>
             <p:cNvSpPr/>
             <p:nvPr/>
           </p:nvSpPr>
@@ -14787,7 +15125,7 @@
         </p:sp>
         <p:sp>
           <p:nvSpPr>
-            <p:cNvPr id="9" name="Textfeld 8"/>
+            <p:cNvPr id="35" name="Textfeld 34"/>
             <p:cNvSpPr txBox="1"/>
             <p:nvPr/>
           </p:nvSpPr>
@@ -14831,21 +15169,21 @@
       </p:grpSp>
       <p:grpSp>
         <p:nvGrpSpPr>
-          <p:cNvPr id="12" name="Gruppieren 11"/>
+          <p:cNvPr id="36" name="Gruppieren 35"/>
           <p:cNvGrpSpPr/>
           <p:nvPr/>
         </p:nvGrpSpPr>
         <p:grpSpPr>
           <a:xfrm>
-            <a:off x="4357583" y="3290912"/>
-            <a:ext cx="718324" cy="1087606"/>
+            <a:off x="6793260" y="2263155"/>
+            <a:ext cx="552064" cy="761121"/>
             <a:chOff x="6055444" y="2636912"/>
             <a:chExt cx="718324" cy="1087606"/>
           </a:xfrm>
         </p:grpSpPr>
         <p:sp>
           <p:nvSpPr>
-            <p:cNvPr id="14" name="Eine Ecke des Rechtecks schneiden 13"/>
+            <p:cNvPr id="37" name="Eine Ecke des Rechtecks schneiden 36"/>
             <p:cNvSpPr/>
             <p:nvPr/>
           </p:nvSpPr>
@@ -14887,62 +15225,13 @@
             <a:lstStyle/>
             <a:p>
               <a:pPr algn="ctr"/>
-              <a:r>
-                <a:rPr lang="de-DE" sz="700" dirty="0"/>
-                <a:t>&lt;</a:t>
-              </a:r>
-              <a:r>
-                <a:rPr lang="de-DE" sz="700" dirty="0" err="1"/>
-                <a:t>dependency</a:t>
-              </a:r>
-              <a:r>
-                <a:rPr lang="de-DE" sz="700" dirty="0"/>
-                <a:t>&gt;</a:t>
-              </a:r>
-            </a:p>
-            <a:p>
-              <a:pPr algn="ctr"/>
               <a:endParaRPr lang="de-DE" sz="700" dirty="0"/>
-            </a:p>
-            <a:p>
-              <a:pPr algn="ctr"/>
-              <a:r>
-                <a:rPr lang="de-DE" sz="700" dirty="0"/>
-                <a:t>&lt;</a:t>
-              </a:r>
-              <a:r>
-                <a:rPr lang="de-DE" sz="700" dirty="0" err="1" smtClean="0"/>
-                <a:t>dependency</a:t>
-              </a:r>
-              <a:r>
-                <a:rPr lang="de-DE" sz="700" dirty="0"/>
-                <a:t>&gt;</a:t>
-              </a:r>
-            </a:p>
-            <a:p>
-              <a:pPr algn="ctr"/>
-              <a:endParaRPr lang="de-DE" sz="700" dirty="0"/>
-            </a:p>
-            <a:p>
-              <a:pPr algn="ctr"/>
-              <a:r>
-                <a:rPr lang="de-DE" sz="700" dirty="0"/>
-                <a:t>&lt;</a:t>
-              </a:r>
-              <a:r>
-                <a:rPr lang="de-DE" sz="700" dirty="0" err="1"/>
-                <a:t>dependency</a:t>
-              </a:r>
-              <a:r>
-                <a:rPr lang="de-DE" sz="700" dirty="0"/>
-                <a:t>&gt;</a:t>
-              </a:r>
             </a:p>
           </p:txBody>
         </p:sp>
         <p:sp>
           <p:nvSpPr>
-            <p:cNvPr id="15" name="Rechtwinkliges Dreieck 14"/>
+            <p:cNvPr id="38" name="Rechtwinkliges Dreieck 37"/>
             <p:cNvSpPr/>
             <p:nvPr/>
           </p:nvSpPr>
@@ -14988,7 +15277,7 @@
         </p:sp>
         <p:sp>
           <p:nvSpPr>
-            <p:cNvPr id="16" name="Textfeld 15"/>
+            <p:cNvPr id="39" name="Textfeld 38"/>
             <p:cNvSpPr txBox="1"/>
             <p:nvPr/>
           </p:nvSpPr>
@@ -15032,21 +15321,21 @@
       </p:grpSp>
       <p:grpSp>
         <p:nvGrpSpPr>
-          <p:cNvPr id="17" name="Gruppieren 16"/>
+          <p:cNvPr id="40" name="Gruppieren 39"/>
           <p:cNvGrpSpPr/>
           <p:nvPr/>
         </p:nvGrpSpPr>
         <p:grpSpPr>
           <a:xfrm>
-            <a:off x="4315242" y="2132856"/>
-            <a:ext cx="718324" cy="1087606"/>
+            <a:off x="6684232" y="1412776"/>
+            <a:ext cx="552064" cy="761121"/>
             <a:chOff x="6055444" y="2636912"/>
             <a:chExt cx="718324" cy="1087606"/>
           </a:xfrm>
         </p:grpSpPr>
         <p:sp>
           <p:nvSpPr>
-            <p:cNvPr id="18" name="Eine Ecke des Rechtecks schneiden 17"/>
+            <p:cNvPr id="41" name="Eine Ecke des Rechtecks schneiden 40"/>
             <p:cNvSpPr/>
             <p:nvPr/>
           </p:nvSpPr>
@@ -15089,61 +15378,24 @@
             <a:p>
               <a:pPr algn="ctr"/>
               <a:r>
-                <a:rPr lang="de-DE" sz="700" dirty="0"/>
+                <a:rPr lang="de-DE" sz="500" dirty="0"/>
                 <a:t>&lt;</a:t>
               </a:r>
               <a:r>
-                <a:rPr lang="de-DE" sz="700" dirty="0" err="1"/>
+                <a:rPr lang="de-DE" sz="500" dirty="0" err="1"/>
                 <a:t>dependency</a:t>
               </a:r>
               <a:r>
-                <a:rPr lang="de-DE" sz="700" dirty="0"/>
+                <a:rPr lang="de-DE" sz="500" dirty="0" smtClean="0"/>
                 <a:t>&gt;</a:t>
               </a:r>
-            </a:p>
-            <a:p>
-              <a:pPr algn="ctr"/>
-              <a:endParaRPr lang="de-DE" sz="700" dirty="0"/>
-            </a:p>
-            <a:p>
-              <a:pPr algn="ctr"/>
-              <a:r>
-                <a:rPr lang="de-DE" sz="700" dirty="0"/>
-                <a:t>&lt;</a:t>
-              </a:r>
-              <a:r>
-                <a:rPr lang="de-DE" sz="700" dirty="0" err="1" smtClean="0"/>
-                <a:t>dependency</a:t>
-              </a:r>
-              <a:r>
-                <a:rPr lang="de-DE" sz="700" dirty="0"/>
-                <a:t>&gt;</a:t>
-              </a:r>
-            </a:p>
-            <a:p>
-              <a:pPr algn="ctr"/>
-              <a:endParaRPr lang="de-DE" sz="700" dirty="0"/>
-            </a:p>
-            <a:p>
-              <a:pPr algn="ctr"/>
-              <a:r>
-                <a:rPr lang="de-DE" sz="700" dirty="0"/>
-                <a:t>&lt;</a:t>
-              </a:r>
-              <a:r>
-                <a:rPr lang="de-DE" sz="700" dirty="0" err="1"/>
-                <a:t>dependency</a:t>
-              </a:r>
-              <a:r>
-                <a:rPr lang="de-DE" sz="700" dirty="0"/>
-                <a:t>&gt;</a:t>
-              </a:r>
+              <a:endParaRPr lang="de-DE" sz="500" dirty="0"/>
             </a:p>
           </p:txBody>
         </p:sp>
         <p:sp>
           <p:nvSpPr>
-            <p:cNvPr id="19" name="Rechtwinkliges Dreieck 18"/>
+            <p:cNvPr id="42" name="Rechtwinkliges Dreieck 41"/>
             <p:cNvSpPr/>
             <p:nvPr/>
           </p:nvSpPr>
@@ -15189,7 +15441,7 @@
         </p:sp>
         <p:sp>
           <p:nvSpPr>
-            <p:cNvPr id="20" name="Textfeld 19"/>
+            <p:cNvPr id="43" name="Textfeld 42"/>
             <p:cNvSpPr txBox="1"/>
             <p:nvPr/>
           </p:nvSpPr>
@@ -15233,21 +15485,21 @@
       </p:grpSp>
       <p:grpSp>
         <p:nvGrpSpPr>
-          <p:cNvPr id="21" name="Gruppieren 20"/>
+          <p:cNvPr id="44" name="Gruppieren 43"/>
           <p:cNvGrpSpPr/>
           <p:nvPr/>
         </p:nvGrpSpPr>
         <p:grpSpPr>
           <a:xfrm>
-            <a:off x="5513555" y="2372861"/>
-            <a:ext cx="718324" cy="1087606"/>
+            <a:off x="7620336" y="1268760"/>
+            <a:ext cx="552064" cy="761121"/>
             <a:chOff x="6055444" y="2636912"/>
             <a:chExt cx="718324" cy="1087606"/>
           </a:xfrm>
         </p:grpSpPr>
         <p:sp>
           <p:nvSpPr>
-            <p:cNvPr id="22" name="Eine Ecke des Rechtecks schneiden 21"/>
+            <p:cNvPr id="45" name="Eine Ecke des Rechtecks schneiden 44"/>
             <p:cNvSpPr/>
             <p:nvPr/>
           </p:nvSpPr>
@@ -15289,62 +15541,13 @@
             <a:lstStyle/>
             <a:p>
               <a:pPr algn="ctr"/>
-              <a:r>
-                <a:rPr lang="de-DE" sz="700" dirty="0"/>
-                <a:t>&lt;</a:t>
-              </a:r>
-              <a:r>
-                <a:rPr lang="de-DE" sz="700" dirty="0" err="1"/>
-                <a:t>dependency</a:t>
-              </a:r>
-              <a:r>
-                <a:rPr lang="de-DE" sz="700" dirty="0"/>
-                <a:t>&gt;</a:t>
-              </a:r>
-            </a:p>
-            <a:p>
-              <a:pPr algn="ctr"/>
               <a:endParaRPr lang="de-DE" sz="700" dirty="0"/>
-            </a:p>
-            <a:p>
-              <a:pPr algn="ctr"/>
-              <a:r>
-                <a:rPr lang="de-DE" sz="700" dirty="0"/>
-                <a:t>&lt;</a:t>
-              </a:r>
-              <a:r>
-                <a:rPr lang="de-DE" sz="700" dirty="0" err="1" smtClean="0"/>
-                <a:t>dependency</a:t>
-              </a:r>
-              <a:r>
-                <a:rPr lang="de-DE" sz="700" dirty="0"/>
-                <a:t>&gt;</a:t>
-              </a:r>
-            </a:p>
-            <a:p>
-              <a:pPr algn="ctr"/>
-              <a:endParaRPr lang="de-DE" sz="700" dirty="0"/>
-            </a:p>
-            <a:p>
-              <a:pPr algn="ctr"/>
-              <a:r>
-                <a:rPr lang="de-DE" sz="700" dirty="0"/>
-                <a:t>&lt;</a:t>
-              </a:r>
-              <a:r>
-                <a:rPr lang="de-DE" sz="700" dirty="0" err="1"/>
-                <a:t>dependency</a:t>
-              </a:r>
-              <a:r>
-                <a:rPr lang="de-DE" sz="700" dirty="0"/>
-                <a:t>&gt;</a:t>
-              </a:r>
             </a:p>
           </p:txBody>
         </p:sp>
         <p:sp>
           <p:nvSpPr>
-            <p:cNvPr id="23" name="Rechtwinkliges Dreieck 22"/>
+            <p:cNvPr id="46" name="Rechtwinkliges Dreieck 45"/>
             <p:cNvSpPr/>
             <p:nvPr/>
           </p:nvSpPr>
@@ -15390,7 +15593,7 @@
         </p:sp>
         <p:sp>
           <p:nvSpPr>
-            <p:cNvPr id="24" name="Textfeld 23"/>
+            <p:cNvPr id="47" name="Textfeld 46"/>
             <p:cNvSpPr txBox="1"/>
             <p:nvPr/>
           </p:nvSpPr>
@@ -15434,17 +15637,17 @@
       </p:grpSp>
       <p:cxnSp>
         <p:nvCxnSpPr>
-          <p:cNvPr id="25" name="Gerade Verbindung 24"/>
+          <p:cNvPr id="48" name="Gerade Verbindung 47"/>
           <p:cNvCxnSpPr>
-            <a:stCxn id="8" idx="0"/>
-            <a:endCxn id="18" idx="2"/>
+            <a:stCxn id="33" idx="0"/>
+            <a:endCxn id="41" idx="2"/>
           </p:cNvCxnSpPr>
           <p:nvPr/>
         </p:nvCxnSpPr>
         <p:spPr>
           <a:xfrm flipV="1">
-            <a:off x="3909127" y="2564904"/>
-            <a:ext cx="406115" cy="70450"/>
+            <a:off x="6305696" y="1715129"/>
+            <a:ext cx="378536" cy="463015"/>
           </a:xfrm>
           <a:prstGeom prst="line">
             <a:avLst/>
@@ -15472,17 +15675,17 @@
       </p:cxnSp>
       <p:cxnSp>
         <p:nvCxnSpPr>
-          <p:cNvPr id="29" name="Gerade Verbindung 28"/>
+          <p:cNvPr id="49" name="Gerade Verbindung 48"/>
           <p:cNvCxnSpPr>
-            <a:stCxn id="8" idx="0"/>
-            <a:endCxn id="14" idx="2"/>
+            <a:stCxn id="33" idx="0"/>
+            <a:endCxn id="37" idx="2"/>
           </p:cNvCxnSpPr>
           <p:nvPr/>
         </p:nvCxnSpPr>
         <p:spPr>
           <a:xfrm>
-            <a:off x="3909127" y="2635354"/>
-            <a:ext cx="448456" cy="1087606"/>
+            <a:off x="6305696" y="2178144"/>
+            <a:ext cx="487564" cy="387364"/>
           </a:xfrm>
           <a:prstGeom prst="line">
             <a:avLst/>
@@ -15510,17 +15713,17 @@
       </p:cxnSp>
       <p:cxnSp>
         <p:nvCxnSpPr>
-          <p:cNvPr id="32" name="Gerade Verbindung 31"/>
+          <p:cNvPr id="50" name="Gerade Verbindung 49"/>
           <p:cNvCxnSpPr>
-            <a:stCxn id="18" idx="0"/>
-            <a:endCxn id="22" idx="2"/>
+            <a:stCxn id="41" idx="0"/>
+            <a:endCxn id="45" idx="2"/>
           </p:cNvCxnSpPr>
           <p:nvPr/>
         </p:nvCxnSpPr>
         <p:spPr>
-          <a:xfrm>
-            <a:off x="5033566" y="2564904"/>
-            <a:ext cx="479989" cy="240005"/>
+          <a:xfrm flipV="1">
+            <a:off x="7236296" y="1571113"/>
+            <a:ext cx="384040" cy="144016"/>
           </a:xfrm>
           <a:prstGeom prst="line">
             <a:avLst/>
@@ -15546,10 +15749,550 @@
           </a:fontRef>
         </p:style>
       </p:cxnSp>
+      <p:sp>
+        <p:nvSpPr>
+          <p:cNvPr id="51" name="Richtungspfeil 50"/>
+          <p:cNvSpPr/>
+          <p:nvPr/>
+        </p:nvSpPr>
+        <p:spPr>
+          <a:xfrm rot="5400000">
+            <a:off x="671833" y="1040090"/>
+            <a:ext cx="1054419" cy="1895046"/>
+          </a:xfrm>
+          <a:prstGeom prst="homePlate">
+            <a:avLst/>
+          </a:prstGeom>
+          <a:solidFill>
+            <a:srgbClr val="0088CC"/>
+          </a:solidFill>
+          <a:ln>
+            <a:noFill/>
+          </a:ln>
+        </p:spPr>
+        <p:style>
+          <a:lnRef idx="2">
+            <a:schemeClr val="accent1">
+              <a:shade val="50000"/>
+            </a:schemeClr>
+          </a:lnRef>
+          <a:fillRef idx="1">
+            <a:schemeClr val="accent1"/>
+          </a:fillRef>
+          <a:effectRef idx="0">
+            <a:schemeClr val="accent1"/>
+          </a:effectRef>
+          <a:fontRef idx="minor">
+            <a:schemeClr val="lt1"/>
+          </a:fontRef>
+        </p:style>
+        <p:txBody>
+          <a:bodyPr rtlCol="0" anchor="ctr"/>
+          <a:lstStyle/>
+          <a:p>
+            <a:pPr algn="ctr"/>
+            <a:endParaRPr lang="de-DE" dirty="0">
+              <a:solidFill>
+                <a:schemeClr val="tx1"/>
+              </a:solidFill>
+            </a:endParaRPr>
+          </a:p>
+        </p:txBody>
+      </p:sp>
+      <p:sp>
+        <p:nvSpPr>
+          <p:cNvPr id="11" name="Textfeld 10"/>
+          <p:cNvSpPr txBox="1"/>
+          <p:nvPr/>
+        </p:nvSpPr>
+        <p:spPr>
+          <a:xfrm>
+            <a:off x="251520" y="1567825"/>
+            <a:ext cx="1895046" cy="276999"/>
+          </a:xfrm>
+          <a:prstGeom prst="rect">
+            <a:avLst/>
+          </a:prstGeom>
+          <a:noFill/>
+        </p:spPr>
+        <p:txBody>
+          <a:bodyPr wrap="square" rtlCol="0">
+            <a:spAutoFit/>
+          </a:bodyPr>
+          <a:lstStyle/>
+          <a:p>
+            <a:pPr algn="ctr"/>
+            <a:r>
+              <a:rPr lang="de-DE" sz="1200" b="1" dirty="0" smtClean="0">
+                <a:solidFill>
+                  <a:schemeClr val="bg1"/>
+                </a:solidFill>
+              </a:rPr>
+              <a:t>Abhängigkeiten auflösen</a:t>
+            </a:r>
+            <a:endParaRPr lang="de-DE" sz="1200" b="1" dirty="0">
+              <a:solidFill>
+                <a:schemeClr val="bg1"/>
+              </a:solidFill>
+            </a:endParaRPr>
+          </a:p>
+        </p:txBody>
+      </p:sp>
+      <p:sp>
+        <p:nvSpPr>
+          <p:cNvPr id="52" name="Textfeld 51"/>
+          <p:cNvSpPr txBox="1"/>
+          <p:nvPr/>
+        </p:nvSpPr>
+        <p:spPr>
+          <a:xfrm>
+            <a:off x="2396609" y="1508028"/>
+            <a:ext cx="5161627" cy="307777"/>
+          </a:xfrm>
+          <a:prstGeom prst="rect">
+            <a:avLst/>
+          </a:prstGeom>
+          <a:noFill/>
+        </p:spPr>
+        <p:txBody>
+          <a:bodyPr wrap="square" rtlCol="0">
+            <a:spAutoFit/>
+          </a:bodyPr>
+          <a:lstStyle/>
+          <a:p>
+            <a:r>
+              <a:rPr lang="de-DE" sz="1400" dirty="0" smtClean="0">
+                <a:latin typeface="Helvetica" panose="020B0604020202020204" pitchFamily="34" charset="0"/>
+                <a:cs typeface="Helvetica" panose="020B0604020202020204" pitchFamily="34" charset="0"/>
+              </a:rPr>
+              <a:t>Mit Hilfe </a:t>
+            </a:r>
+            <a:r>
+              <a:rPr lang="de-DE" sz="1400" dirty="0">
+                <a:latin typeface="Helvetica" panose="020B0604020202020204" pitchFamily="34" charset="0"/>
+                <a:cs typeface="Helvetica" panose="020B0604020202020204" pitchFamily="34" charset="0"/>
+              </a:rPr>
+              <a:t>der </a:t>
+            </a:r>
+            <a:r>
+              <a:rPr lang="de-DE" sz="1400" dirty="0" err="1">
+                <a:latin typeface="Helvetica" panose="020B0604020202020204" pitchFamily="34" charset="0"/>
+                <a:cs typeface="Helvetica" panose="020B0604020202020204" pitchFamily="34" charset="0"/>
+              </a:rPr>
+              <a:t>Aether</a:t>
+            </a:r>
+            <a:r>
+              <a:rPr lang="de-DE" sz="1400" dirty="0">
+                <a:latin typeface="Helvetica" panose="020B0604020202020204" pitchFamily="34" charset="0"/>
+                <a:cs typeface="Helvetica" panose="020B0604020202020204" pitchFamily="34" charset="0"/>
+              </a:rPr>
+              <a:t>-Bibliothek von Eclipse</a:t>
+            </a:r>
+            <a:endParaRPr lang="de-DE" sz="1400" dirty="0">
+              <a:latin typeface="Helvetica" panose="020B0604020202020204" pitchFamily="34" charset="0"/>
+              <a:cs typeface="Helvetica" panose="020B0604020202020204" pitchFamily="34" charset="0"/>
+            </a:endParaRPr>
+          </a:p>
+        </p:txBody>
+      </p:sp>
+      <p:sp>
+        <p:nvSpPr>
+          <p:cNvPr id="54" name="Textfeld 53"/>
+          <p:cNvSpPr txBox="1"/>
+          <p:nvPr/>
+        </p:nvSpPr>
+        <p:spPr>
+          <a:xfrm>
+            <a:off x="251518" y="4133957"/>
+            <a:ext cx="1895047" cy="461665"/>
+          </a:xfrm>
+          <a:prstGeom prst="rect">
+            <a:avLst/>
+          </a:prstGeom>
+          <a:noFill/>
+        </p:spPr>
+        <p:txBody>
+          <a:bodyPr wrap="square" rtlCol="0">
+            <a:spAutoFit/>
+          </a:bodyPr>
+          <a:lstStyle/>
+          <a:p>
+            <a:pPr algn="ctr"/>
+            <a:r>
+              <a:rPr lang="de-DE" sz="1200" b="1" dirty="0" smtClean="0">
+                <a:solidFill>
+                  <a:srgbClr val="0088CC"/>
+                </a:solidFill>
+              </a:rPr>
+              <a:t>Graph aus Wrapper-Klassen</a:t>
+            </a:r>
+            <a:endParaRPr lang="de-DE" sz="1200" b="1" dirty="0">
+              <a:solidFill>
+                <a:srgbClr val="0088CC"/>
+              </a:solidFill>
+            </a:endParaRPr>
+          </a:p>
+        </p:txBody>
+      </p:sp>
+      <p:sp>
+        <p:nvSpPr>
+          <p:cNvPr id="56" name="Textfeld 55"/>
+          <p:cNvSpPr txBox="1"/>
+          <p:nvPr/>
+        </p:nvSpPr>
+        <p:spPr>
+          <a:xfrm>
+            <a:off x="2397108" y="3041437"/>
+            <a:ext cx="6351356" cy="523220"/>
+          </a:xfrm>
+          <a:prstGeom prst="rect">
+            <a:avLst/>
+          </a:prstGeom>
+          <a:noFill/>
+        </p:spPr>
+        <p:txBody>
+          <a:bodyPr wrap="square" rtlCol="0">
+            <a:spAutoFit/>
+          </a:bodyPr>
+          <a:lstStyle/>
+          <a:p>
+            <a:r>
+              <a:rPr lang="de-DE" sz="1400" dirty="0" smtClean="0">
+                <a:latin typeface="Helvetica" panose="020B0604020202020204" pitchFamily="34" charset="0"/>
+                <a:cs typeface="Helvetica" panose="020B0604020202020204" pitchFamily="34" charset="0"/>
+              </a:rPr>
+              <a:t>Bilden von Wrapper-Objekten für einzelne Abhängigkeiten und Beziehungen erstellen </a:t>
+            </a:r>
+            <a:endParaRPr lang="de-DE" sz="1400" dirty="0">
+              <a:latin typeface="Helvetica" panose="020B0604020202020204" pitchFamily="34" charset="0"/>
+              <a:cs typeface="Helvetica" panose="020B0604020202020204" pitchFamily="34" charset="0"/>
+            </a:endParaRPr>
+          </a:p>
+        </p:txBody>
+      </p:sp>
+      <p:sp>
+        <p:nvSpPr>
+          <p:cNvPr id="58" name="Textfeld 57"/>
+          <p:cNvSpPr txBox="1"/>
+          <p:nvPr/>
+        </p:nvSpPr>
+        <p:spPr>
+          <a:xfrm>
+            <a:off x="251520" y="4725144"/>
+            <a:ext cx="1895045" cy="461665"/>
+          </a:xfrm>
+          <a:prstGeom prst="rect">
+            <a:avLst/>
+          </a:prstGeom>
+          <a:noFill/>
+        </p:spPr>
+        <p:txBody>
+          <a:bodyPr wrap="square" rtlCol="0">
+            <a:spAutoFit/>
+          </a:bodyPr>
+          <a:lstStyle/>
+          <a:p>
+            <a:pPr algn="ctr"/>
+            <a:r>
+              <a:rPr lang="de-DE" sz="1200" b="1" dirty="0" smtClean="0">
+                <a:solidFill>
+                  <a:schemeClr val="bg1"/>
+                </a:solidFill>
+              </a:rPr>
+              <a:t>Anreichern der Knoten mit </a:t>
+            </a:r>
+            <a:r>
+              <a:rPr lang="de-DE" sz="1200" b="1" dirty="0" err="1" smtClean="0">
+                <a:solidFill>
+                  <a:schemeClr val="bg1"/>
+                </a:solidFill>
+              </a:rPr>
+              <a:t>Clash</a:t>
+            </a:r>
+            <a:r>
+              <a:rPr lang="de-DE" sz="1200" b="1" dirty="0" smtClean="0">
+                <a:solidFill>
+                  <a:schemeClr val="bg1"/>
+                </a:solidFill>
+              </a:rPr>
+              <a:t>-Informationen</a:t>
+            </a:r>
+            <a:endParaRPr lang="de-DE" sz="1200" b="1" dirty="0">
+              <a:solidFill>
+                <a:schemeClr val="bg1"/>
+              </a:solidFill>
+            </a:endParaRPr>
+          </a:p>
+        </p:txBody>
+      </p:sp>
+      <p:sp>
+        <p:nvSpPr>
+          <p:cNvPr id="59" name="Textfeld 58"/>
+          <p:cNvSpPr txBox="1"/>
+          <p:nvPr/>
+        </p:nvSpPr>
+        <p:spPr>
+          <a:xfrm>
+            <a:off x="2367180" y="4663589"/>
+            <a:ext cx="6381284" cy="738664"/>
+          </a:xfrm>
+          <a:prstGeom prst="rect">
+            <a:avLst/>
+          </a:prstGeom>
+          <a:noFill/>
+        </p:spPr>
+        <p:txBody>
+          <a:bodyPr wrap="square" rtlCol="0">
+            <a:spAutoFit/>
+          </a:bodyPr>
+          <a:lstStyle/>
+          <a:p>
+            <a:r>
+              <a:rPr lang="de-DE" sz="1400" dirty="0" smtClean="0">
+                <a:latin typeface="Helvetica" panose="020B0604020202020204" pitchFamily="34" charset="0"/>
+                <a:cs typeface="Helvetica" panose="020B0604020202020204" pitchFamily="34" charset="0"/>
+              </a:rPr>
+              <a:t>Abhängigkeiten auf gleiches Projekt (</a:t>
+            </a:r>
+            <a:r>
+              <a:rPr lang="de-DE" sz="1400" dirty="0" err="1" smtClean="0">
+                <a:latin typeface="Helvetica" panose="020B0604020202020204" pitchFamily="34" charset="0"/>
+                <a:cs typeface="Helvetica" panose="020B0604020202020204" pitchFamily="34" charset="0"/>
+              </a:rPr>
+              <a:t>groupId:artifactId</a:t>
+            </a:r>
+            <a:r>
+              <a:rPr lang="de-DE" sz="1400" dirty="0" smtClean="0">
+                <a:latin typeface="Helvetica" panose="020B0604020202020204" pitchFamily="34" charset="0"/>
+                <a:cs typeface="Helvetica" panose="020B0604020202020204" pitchFamily="34" charset="0"/>
+              </a:rPr>
+              <a:t>) werden in Beziehung gesetzt und auf </a:t>
+            </a:r>
+            <a:r>
+              <a:rPr lang="de-DE" sz="1400" dirty="0" err="1" smtClean="0">
+                <a:latin typeface="Helvetica" panose="020B0604020202020204" pitchFamily="34" charset="0"/>
+                <a:cs typeface="Helvetica" panose="020B0604020202020204" pitchFamily="34" charset="0"/>
+              </a:rPr>
+              <a:t>Clashes</a:t>
+            </a:r>
+            <a:r>
+              <a:rPr lang="de-DE" sz="1400" dirty="0" smtClean="0">
+                <a:latin typeface="Helvetica" panose="020B0604020202020204" pitchFamily="34" charset="0"/>
+                <a:cs typeface="Helvetica" panose="020B0604020202020204" pitchFamily="34" charset="0"/>
+              </a:rPr>
+              <a:t> hin untersucht &amp; gegebenenfalls mit </a:t>
+            </a:r>
+            <a:r>
+              <a:rPr lang="de-DE" sz="1400" dirty="0" err="1" smtClean="0">
+                <a:latin typeface="Helvetica" panose="020B0604020202020204" pitchFamily="34" charset="0"/>
+                <a:cs typeface="Helvetica" panose="020B0604020202020204" pitchFamily="34" charset="0"/>
+              </a:rPr>
+              <a:t>Clash</a:t>
+            </a:r>
+            <a:r>
+              <a:rPr lang="de-DE" sz="1400" dirty="0" smtClean="0">
+                <a:latin typeface="Helvetica" panose="020B0604020202020204" pitchFamily="34" charset="0"/>
+                <a:cs typeface="Helvetica" panose="020B0604020202020204" pitchFamily="34" charset="0"/>
+              </a:rPr>
+              <a:t>-Informationen angereichert</a:t>
+            </a:r>
+            <a:endParaRPr lang="de-DE" sz="1400" dirty="0">
+              <a:latin typeface="Helvetica" panose="020B0604020202020204" pitchFamily="34" charset="0"/>
+              <a:cs typeface="Helvetica" panose="020B0604020202020204" pitchFamily="34" charset="0"/>
+            </a:endParaRPr>
+          </a:p>
+        </p:txBody>
+      </p:sp>
+      <p:sp>
+        <p:nvSpPr>
+          <p:cNvPr id="62" name="Richtungspfeil 61"/>
+          <p:cNvSpPr/>
+          <p:nvPr/>
+        </p:nvSpPr>
+        <p:spPr>
+          <a:xfrm rot="5400000">
+            <a:off x="671832" y="2621124"/>
+            <a:ext cx="1054419" cy="1895046"/>
+          </a:xfrm>
+          <a:prstGeom prst="homePlate">
+            <a:avLst/>
+          </a:prstGeom>
+          <a:solidFill>
+            <a:srgbClr val="0088CC"/>
+          </a:solidFill>
+          <a:ln>
+            <a:noFill/>
+          </a:ln>
+        </p:spPr>
+        <p:style>
+          <a:lnRef idx="2">
+            <a:schemeClr val="accent1">
+              <a:shade val="50000"/>
+            </a:schemeClr>
+          </a:lnRef>
+          <a:fillRef idx="1">
+            <a:schemeClr val="accent1"/>
+          </a:fillRef>
+          <a:effectRef idx="0">
+            <a:schemeClr val="accent1"/>
+          </a:effectRef>
+          <a:fontRef idx="minor">
+            <a:schemeClr val="lt1"/>
+          </a:fontRef>
+        </p:style>
+        <p:txBody>
+          <a:bodyPr rtlCol="0" anchor="ctr"/>
+          <a:lstStyle/>
+          <a:p>
+            <a:pPr algn="ctr"/>
+            <a:endParaRPr lang="de-DE" dirty="0">
+              <a:solidFill>
+                <a:schemeClr val="tx1"/>
+              </a:solidFill>
+            </a:endParaRPr>
+          </a:p>
+        </p:txBody>
+      </p:sp>
+      <p:sp>
+        <p:nvSpPr>
+          <p:cNvPr id="53" name="Textfeld 52"/>
+          <p:cNvSpPr txBox="1"/>
+          <p:nvPr/>
+        </p:nvSpPr>
+        <p:spPr>
+          <a:xfrm>
+            <a:off x="251520" y="3111351"/>
+            <a:ext cx="1895045" cy="461665"/>
+          </a:xfrm>
+          <a:prstGeom prst="rect">
+            <a:avLst/>
+          </a:prstGeom>
+          <a:noFill/>
+        </p:spPr>
+        <p:txBody>
+          <a:bodyPr wrap="square" rtlCol="0">
+            <a:spAutoFit/>
+          </a:bodyPr>
+          <a:lstStyle/>
+          <a:p>
+            <a:pPr algn="ctr"/>
+            <a:r>
+              <a:rPr lang="de-DE" sz="1200" b="1" dirty="0" smtClean="0">
+                <a:solidFill>
+                  <a:schemeClr val="bg1"/>
+                </a:solidFill>
+              </a:rPr>
+              <a:t>Bilden eines eigenen Graphen</a:t>
+            </a:r>
+            <a:endParaRPr lang="de-DE" sz="1200" b="1" dirty="0">
+              <a:solidFill>
+                <a:schemeClr val="bg1"/>
+              </a:solidFill>
+            </a:endParaRPr>
+          </a:p>
+        </p:txBody>
+      </p:sp>
+      <p:sp>
+        <p:nvSpPr>
+          <p:cNvPr id="28" name="Pfeil nach links 27"/>
+          <p:cNvSpPr/>
+          <p:nvPr/>
+        </p:nvSpPr>
+        <p:spPr>
+          <a:xfrm>
+            <a:off x="2150522" y="5669456"/>
+            <a:ext cx="4747472" cy="529732"/>
+          </a:xfrm>
+          <a:prstGeom prst="leftArrow">
+            <a:avLst/>
+          </a:prstGeom>
+          <a:solidFill>
+            <a:srgbClr val="E3E3E3"/>
+          </a:solidFill>
+          <a:ln>
+            <a:noFill/>
+          </a:ln>
+        </p:spPr>
+        <p:style>
+          <a:lnRef idx="2">
+            <a:schemeClr val="accent1">
+              <a:shade val="50000"/>
+            </a:schemeClr>
+          </a:lnRef>
+          <a:fillRef idx="1">
+            <a:schemeClr val="accent1"/>
+          </a:fillRef>
+          <a:effectRef idx="0">
+            <a:schemeClr val="accent1"/>
+          </a:effectRef>
+          <a:fontRef idx="minor">
+            <a:schemeClr val="lt1"/>
+          </a:fontRef>
+        </p:style>
+        <p:txBody>
+          <a:bodyPr rtlCol="0" anchor="ctr"/>
+          <a:lstStyle/>
+          <a:p>
+            <a:pPr algn="ctr"/>
+            <a:r>
+              <a:rPr lang="de-DE" dirty="0" smtClean="0">
+                <a:solidFill>
+                  <a:srgbClr val="0088CC"/>
+                </a:solidFill>
+              </a:rPr>
+              <a:t>Alle benötigten Informationen enthalten</a:t>
+            </a:r>
+            <a:endParaRPr lang="de-DE" dirty="0">
+              <a:solidFill>
+                <a:srgbClr val="0088CC"/>
+              </a:solidFill>
+            </a:endParaRPr>
+          </a:p>
+        </p:txBody>
+      </p:sp>
+      <p:sp>
+        <p:nvSpPr>
+          <p:cNvPr id="64" name="Textfeld 63"/>
+          <p:cNvSpPr txBox="1"/>
+          <p:nvPr/>
+        </p:nvSpPr>
+        <p:spPr>
+          <a:xfrm>
+            <a:off x="240537" y="5717188"/>
+            <a:ext cx="1895047" cy="461665"/>
+          </a:xfrm>
+          <a:prstGeom prst="rect">
+            <a:avLst/>
+          </a:prstGeom>
+          <a:noFill/>
+        </p:spPr>
+        <p:txBody>
+          <a:bodyPr wrap="square" rtlCol="0">
+            <a:spAutoFit/>
+          </a:bodyPr>
+          <a:lstStyle/>
+          <a:p>
+            <a:pPr algn="ctr"/>
+            <a:r>
+              <a:rPr lang="de-DE" sz="1200" b="1" dirty="0" smtClean="0">
+                <a:solidFill>
+                  <a:srgbClr val="0088CC"/>
+                </a:solidFill>
+              </a:rPr>
+              <a:t>Graph aus angereicherten Wrapper-Klassen</a:t>
+            </a:r>
+            <a:endParaRPr lang="de-DE" sz="1200" b="1" dirty="0">
+              <a:solidFill>
+                <a:srgbClr val="0088CC"/>
+              </a:solidFill>
+            </a:endParaRPr>
+          </a:p>
+        </p:txBody>
+      </p:sp>
     </p:spTree>
     <p:extLst>
       <p:ext uri="{BB962C8B-B14F-4D97-AF65-F5344CB8AC3E}">
-        <p14:creationId xmlns:p14="http://schemas.microsoft.com/office/powerpoint/2010/main" val="606394329"/>
+        <p14:creationId xmlns:p14="http://schemas.microsoft.com/office/powerpoint/2010/main" val="4204037904"/>
       </p:ext>
     </p:extLst>
   </p:cSld>
@@ -15559,14 +16302,1549 @@
   <p:timing>
     <p:tnLst>
       <p:par>
-        <p:cTn id="1" dur="indefinite" restart="never" nodeType="tmRoot"/>
+        <p:cTn id="1" dur="indefinite" restart="never" nodeType="tmRoot">
+          <p:childTnLst>
+            <p:seq concurrent="1" nextAc="seek">
+              <p:cTn id="2" dur="indefinite" nodeType="mainSeq">
+                <p:childTnLst>
+                  <p:par>
+                    <p:cTn id="3" fill="hold">
+                      <p:stCondLst>
+                        <p:cond delay="indefinite"/>
+                      </p:stCondLst>
+                      <p:childTnLst>
+                        <p:par>
+                          <p:cTn id="4" fill="hold">
+                            <p:stCondLst>
+                              <p:cond delay="0"/>
+                            </p:stCondLst>
+                            <p:childTnLst>
+                              <p:par>
+                                <p:cTn id="5" presetID="1" presetClass="entr" presetSubtype="0" fill="hold" grpId="0" nodeType="clickEffect">
+                                  <p:stCondLst>
+                                    <p:cond delay="0"/>
+                                  </p:stCondLst>
+                                  <p:childTnLst>
+                                    <p:set>
+                                      <p:cBhvr>
+                                        <p:cTn id="6" dur="1" fill="hold">
+                                          <p:stCondLst>
+                                            <p:cond delay="0"/>
+                                          </p:stCondLst>
+                                        </p:cTn>
+                                        <p:tgtEl>
+                                          <p:spTgt spid="51"/>
+                                        </p:tgtEl>
+                                        <p:attrNameLst>
+                                          <p:attrName>style.visibility</p:attrName>
+                                        </p:attrNameLst>
+                                      </p:cBhvr>
+                                      <p:to>
+                                        <p:strVal val="visible"/>
+                                      </p:to>
+                                    </p:set>
+                                  </p:childTnLst>
+                                </p:cTn>
+                              </p:par>
+                              <p:par>
+                                <p:cTn id="7" presetID="1" presetClass="entr" presetSubtype="0" fill="hold" grpId="0" nodeType="withEffect">
+                                  <p:stCondLst>
+                                    <p:cond delay="0"/>
+                                  </p:stCondLst>
+                                  <p:childTnLst>
+                                    <p:set>
+                                      <p:cBhvr>
+                                        <p:cTn id="8" dur="1" fill="hold">
+                                          <p:stCondLst>
+                                            <p:cond delay="0"/>
+                                          </p:stCondLst>
+                                        </p:cTn>
+                                        <p:tgtEl>
+                                          <p:spTgt spid="11"/>
+                                        </p:tgtEl>
+                                        <p:attrNameLst>
+                                          <p:attrName>style.visibility</p:attrName>
+                                        </p:attrNameLst>
+                                      </p:cBhvr>
+                                      <p:to>
+                                        <p:strVal val="visible"/>
+                                      </p:to>
+                                    </p:set>
+                                  </p:childTnLst>
+                                </p:cTn>
+                              </p:par>
+                              <p:par>
+                                <p:cTn id="9" presetID="1" presetClass="entr" presetSubtype="0" fill="hold" grpId="0" nodeType="withEffect">
+                                  <p:stCondLst>
+                                    <p:cond delay="0"/>
+                                  </p:stCondLst>
+                                  <p:childTnLst>
+                                    <p:set>
+                                      <p:cBhvr>
+                                        <p:cTn id="10" dur="1" fill="hold">
+                                          <p:stCondLst>
+                                            <p:cond delay="0"/>
+                                          </p:stCondLst>
+                                        </p:cTn>
+                                        <p:tgtEl>
+                                          <p:spTgt spid="27"/>
+                                        </p:tgtEl>
+                                        <p:attrNameLst>
+                                          <p:attrName>style.visibility</p:attrName>
+                                        </p:attrNameLst>
+                                      </p:cBhvr>
+                                      <p:to>
+                                        <p:strVal val="visible"/>
+                                      </p:to>
+                                    </p:set>
+                                  </p:childTnLst>
+                                </p:cTn>
+                              </p:par>
+                              <p:par>
+                                <p:cTn id="11" presetID="1" presetClass="entr" presetSubtype="0" fill="hold" grpId="0" nodeType="withEffect">
+                                  <p:stCondLst>
+                                    <p:cond delay="0"/>
+                                  </p:stCondLst>
+                                  <p:childTnLst>
+                                    <p:set>
+                                      <p:cBhvr>
+                                        <p:cTn id="12" dur="1" fill="hold">
+                                          <p:stCondLst>
+                                            <p:cond delay="0"/>
+                                          </p:stCondLst>
+                                        </p:cTn>
+                                        <p:tgtEl>
+                                          <p:spTgt spid="52"/>
+                                        </p:tgtEl>
+                                        <p:attrNameLst>
+                                          <p:attrName>style.visibility</p:attrName>
+                                        </p:attrNameLst>
+                                      </p:cBhvr>
+                                      <p:to>
+                                        <p:strVal val="visible"/>
+                                      </p:to>
+                                    </p:set>
+                                  </p:childTnLst>
+                                </p:cTn>
+                              </p:par>
+                            </p:childTnLst>
+                          </p:cTn>
+                        </p:par>
+                      </p:childTnLst>
+                    </p:cTn>
+                  </p:par>
+                  <p:par>
+                    <p:cTn id="13" fill="hold">
+                      <p:stCondLst>
+                        <p:cond delay="indefinite"/>
+                      </p:stCondLst>
+                      <p:childTnLst>
+                        <p:par>
+                          <p:cTn id="14" fill="hold">
+                            <p:stCondLst>
+                              <p:cond delay="0"/>
+                            </p:stCondLst>
+                            <p:childTnLst>
+                              <p:par>
+                                <p:cTn id="15" presetID="1" presetClass="entr" presetSubtype="0" fill="hold" nodeType="clickEffect">
+                                  <p:stCondLst>
+                                    <p:cond delay="0"/>
+                                  </p:stCondLst>
+                                  <p:childTnLst>
+                                    <p:set>
+                                      <p:cBhvr>
+                                        <p:cTn id="16" dur="1" fill="hold">
+                                          <p:stCondLst>
+                                            <p:cond delay="0"/>
+                                          </p:stCondLst>
+                                        </p:cTn>
+                                        <p:tgtEl>
+                                          <p:spTgt spid="31"/>
+                                        </p:tgtEl>
+                                        <p:attrNameLst>
+                                          <p:attrName>style.visibility</p:attrName>
+                                        </p:attrNameLst>
+                                      </p:cBhvr>
+                                      <p:to>
+                                        <p:strVal val="visible"/>
+                                      </p:to>
+                                    </p:set>
+                                  </p:childTnLst>
+                                </p:cTn>
+                              </p:par>
+                              <p:par>
+                                <p:cTn id="17" presetID="1" presetClass="entr" presetSubtype="0" fill="hold" nodeType="withEffect">
+                                  <p:stCondLst>
+                                    <p:cond delay="0"/>
+                                  </p:stCondLst>
+                                  <p:childTnLst>
+                                    <p:set>
+                                      <p:cBhvr>
+                                        <p:cTn id="18" dur="1" fill="hold">
+                                          <p:stCondLst>
+                                            <p:cond delay="0"/>
+                                          </p:stCondLst>
+                                        </p:cTn>
+                                        <p:tgtEl>
+                                          <p:spTgt spid="36"/>
+                                        </p:tgtEl>
+                                        <p:attrNameLst>
+                                          <p:attrName>style.visibility</p:attrName>
+                                        </p:attrNameLst>
+                                      </p:cBhvr>
+                                      <p:to>
+                                        <p:strVal val="visible"/>
+                                      </p:to>
+                                    </p:set>
+                                  </p:childTnLst>
+                                </p:cTn>
+                              </p:par>
+                              <p:par>
+                                <p:cTn id="19" presetID="1" presetClass="entr" presetSubtype="0" fill="hold" nodeType="withEffect">
+                                  <p:stCondLst>
+                                    <p:cond delay="0"/>
+                                  </p:stCondLst>
+                                  <p:childTnLst>
+                                    <p:set>
+                                      <p:cBhvr>
+                                        <p:cTn id="20" dur="1" fill="hold">
+                                          <p:stCondLst>
+                                            <p:cond delay="0"/>
+                                          </p:stCondLst>
+                                        </p:cTn>
+                                        <p:tgtEl>
+                                          <p:spTgt spid="40"/>
+                                        </p:tgtEl>
+                                        <p:attrNameLst>
+                                          <p:attrName>style.visibility</p:attrName>
+                                        </p:attrNameLst>
+                                      </p:cBhvr>
+                                      <p:to>
+                                        <p:strVal val="visible"/>
+                                      </p:to>
+                                    </p:set>
+                                  </p:childTnLst>
+                                </p:cTn>
+                              </p:par>
+                              <p:par>
+                                <p:cTn id="21" presetID="1" presetClass="entr" presetSubtype="0" fill="hold" nodeType="withEffect">
+                                  <p:stCondLst>
+                                    <p:cond delay="0"/>
+                                  </p:stCondLst>
+                                  <p:childTnLst>
+                                    <p:set>
+                                      <p:cBhvr>
+                                        <p:cTn id="22" dur="1" fill="hold">
+                                          <p:stCondLst>
+                                            <p:cond delay="0"/>
+                                          </p:stCondLst>
+                                        </p:cTn>
+                                        <p:tgtEl>
+                                          <p:spTgt spid="44"/>
+                                        </p:tgtEl>
+                                        <p:attrNameLst>
+                                          <p:attrName>style.visibility</p:attrName>
+                                        </p:attrNameLst>
+                                      </p:cBhvr>
+                                      <p:to>
+                                        <p:strVal val="visible"/>
+                                      </p:to>
+                                    </p:set>
+                                  </p:childTnLst>
+                                </p:cTn>
+                              </p:par>
+                              <p:par>
+                                <p:cTn id="23" presetID="1" presetClass="entr" presetSubtype="0" fill="hold" nodeType="withEffect">
+                                  <p:stCondLst>
+                                    <p:cond delay="0"/>
+                                  </p:stCondLst>
+                                  <p:childTnLst>
+                                    <p:set>
+                                      <p:cBhvr>
+                                        <p:cTn id="24" dur="1" fill="hold">
+                                          <p:stCondLst>
+                                            <p:cond delay="0"/>
+                                          </p:stCondLst>
+                                        </p:cTn>
+                                        <p:tgtEl>
+                                          <p:spTgt spid="48"/>
+                                        </p:tgtEl>
+                                        <p:attrNameLst>
+                                          <p:attrName>style.visibility</p:attrName>
+                                        </p:attrNameLst>
+                                      </p:cBhvr>
+                                      <p:to>
+                                        <p:strVal val="visible"/>
+                                      </p:to>
+                                    </p:set>
+                                  </p:childTnLst>
+                                </p:cTn>
+                              </p:par>
+                              <p:par>
+                                <p:cTn id="25" presetID="1" presetClass="entr" presetSubtype="0" fill="hold" nodeType="withEffect">
+                                  <p:stCondLst>
+                                    <p:cond delay="0"/>
+                                  </p:stCondLst>
+                                  <p:childTnLst>
+                                    <p:set>
+                                      <p:cBhvr>
+                                        <p:cTn id="26" dur="1" fill="hold">
+                                          <p:stCondLst>
+                                            <p:cond delay="0"/>
+                                          </p:stCondLst>
+                                        </p:cTn>
+                                        <p:tgtEl>
+                                          <p:spTgt spid="49"/>
+                                        </p:tgtEl>
+                                        <p:attrNameLst>
+                                          <p:attrName>style.visibility</p:attrName>
+                                        </p:attrNameLst>
+                                      </p:cBhvr>
+                                      <p:to>
+                                        <p:strVal val="visible"/>
+                                      </p:to>
+                                    </p:set>
+                                  </p:childTnLst>
+                                </p:cTn>
+                              </p:par>
+                              <p:par>
+                                <p:cTn id="27" presetID="1" presetClass="entr" presetSubtype="0" fill="hold" nodeType="withEffect">
+                                  <p:stCondLst>
+                                    <p:cond delay="0"/>
+                                  </p:stCondLst>
+                                  <p:childTnLst>
+                                    <p:set>
+                                      <p:cBhvr>
+                                        <p:cTn id="28" dur="1" fill="hold">
+                                          <p:stCondLst>
+                                            <p:cond delay="0"/>
+                                          </p:stCondLst>
+                                        </p:cTn>
+                                        <p:tgtEl>
+                                          <p:spTgt spid="50"/>
+                                        </p:tgtEl>
+                                        <p:attrNameLst>
+                                          <p:attrName>style.visibility</p:attrName>
+                                        </p:attrNameLst>
+                                      </p:cBhvr>
+                                      <p:to>
+                                        <p:strVal val="visible"/>
+                                      </p:to>
+                                    </p:set>
+                                  </p:childTnLst>
+                                </p:cTn>
+                              </p:par>
+                            </p:childTnLst>
+                          </p:cTn>
+                        </p:par>
+                      </p:childTnLst>
+                    </p:cTn>
+                  </p:par>
+                  <p:par>
+                    <p:cTn id="29" fill="hold">
+                      <p:stCondLst>
+                        <p:cond delay="indefinite"/>
+                      </p:stCondLst>
+                      <p:childTnLst>
+                        <p:par>
+                          <p:cTn id="30" fill="hold">
+                            <p:stCondLst>
+                              <p:cond delay="0"/>
+                            </p:stCondLst>
+                            <p:childTnLst>
+                              <p:par>
+                                <p:cTn id="31" presetID="1" presetClass="entr" presetSubtype="0" fill="hold" grpId="0" nodeType="clickEffect">
+                                  <p:stCondLst>
+                                    <p:cond delay="0"/>
+                                  </p:stCondLst>
+                                  <p:childTnLst>
+                                    <p:set>
+                                      <p:cBhvr>
+                                        <p:cTn id="32" dur="1" fill="hold">
+                                          <p:stCondLst>
+                                            <p:cond delay="0"/>
+                                          </p:stCondLst>
+                                        </p:cTn>
+                                        <p:tgtEl>
+                                          <p:spTgt spid="54"/>
+                                        </p:tgtEl>
+                                        <p:attrNameLst>
+                                          <p:attrName>style.visibility</p:attrName>
+                                        </p:attrNameLst>
+                                      </p:cBhvr>
+                                      <p:to>
+                                        <p:strVal val="visible"/>
+                                      </p:to>
+                                    </p:set>
+                                  </p:childTnLst>
+                                </p:cTn>
+                              </p:par>
+                              <p:par>
+                                <p:cTn id="33" presetID="1" presetClass="entr" presetSubtype="0" fill="hold" grpId="0" nodeType="withEffect">
+                                  <p:stCondLst>
+                                    <p:cond delay="0"/>
+                                  </p:stCondLst>
+                                  <p:childTnLst>
+                                    <p:set>
+                                      <p:cBhvr>
+                                        <p:cTn id="34" dur="1" fill="hold">
+                                          <p:stCondLst>
+                                            <p:cond delay="0"/>
+                                          </p:stCondLst>
+                                        </p:cTn>
+                                        <p:tgtEl>
+                                          <p:spTgt spid="62"/>
+                                        </p:tgtEl>
+                                        <p:attrNameLst>
+                                          <p:attrName>style.visibility</p:attrName>
+                                        </p:attrNameLst>
+                                      </p:cBhvr>
+                                      <p:to>
+                                        <p:strVal val="visible"/>
+                                      </p:to>
+                                    </p:set>
+                                  </p:childTnLst>
+                                </p:cTn>
+                              </p:par>
+                              <p:par>
+                                <p:cTn id="35" presetID="1" presetClass="entr" presetSubtype="0" fill="hold" grpId="0" nodeType="withEffect">
+                                  <p:stCondLst>
+                                    <p:cond delay="0"/>
+                                  </p:stCondLst>
+                                  <p:childTnLst>
+                                    <p:set>
+                                      <p:cBhvr>
+                                        <p:cTn id="36" dur="1" fill="hold">
+                                          <p:stCondLst>
+                                            <p:cond delay="0"/>
+                                          </p:stCondLst>
+                                        </p:cTn>
+                                        <p:tgtEl>
+                                          <p:spTgt spid="53"/>
+                                        </p:tgtEl>
+                                        <p:attrNameLst>
+                                          <p:attrName>style.visibility</p:attrName>
+                                        </p:attrNameLst>
+                                      </p:cBhvr>
+                                      <p:to>
+                                        <p:strVal val="visible"/>
+                                      </p:to>
+                                    </p:set>
+                                  </p:childTnLst>
+                                </p:cTn>
+                              </p:par>
+                              <p:par>
+                                <p:cTn id="37" presetID="1" presetClass="entr" presetSubtype="0" fill="hold" grpId="0" nodeType="withEffect">
+                                  <p:stCondLst>
+                                    <p:cond delay="0"/>
+                                  </p:stCondLst>
+                                  <p:childTnLst>
+                                    <p:set>
+                                      <p:cBhvr>
+                                        <p:cTn id="38" dur="1" fill="hold">
+                                          <p:stCondLst>
+                                            <p:cond delay="0"/>
+                                          </p:stCondLst>
+                                        </p:cTn>
+                                        <p:tgtEl>
+                                          <p:spTgt spid="56"/>
+                                        </p:tgtEl>
+                                        <p:attrNameLst>
+                                          <p:attrName>style.visibility</p:attrName>
+                                        </p:attrNameLst>
+                                      </p:cBhvr>
+                                      <p:to>
+                                        <p:strVal val="visible"/>
+                                      </p:to>
+                                    </p:set>
+                                  </p:childTnLst>
+                                </p:cTn>
+                              </p:par>
+                            </p:childTnLst>
+                          </p:cTn>
+                        </p:par>
+                      </p:childTnLst>
+                    </p:cTn>
+                  </p:par>
+                  <p:par>
+                    <p:cTn id="39" fill="hold">
+                      <p:stCondLst>
+                        <p:cond delay="indefinite"/>
+                      </p:stCondLst>
+                      <p:childTnLst>
+                        <p:par>
+                          <p:cTn id="40" fill="hold">
+                            <p:stCondLst>
+                              <p:cond delay="0"/>
+                            </p:stCondLst>
+                            <p:childTnLst>
+                              <p:par>
+                                <p:cTn id="41" presetID="1" presetClass="entr" presetSubtype="0" fill="hold" grpId="0" nodeType="clickEffect">
+                                  <p:stCondLst>
+                                    <p:cond delay="0"/>
+                                  </p:stCondLst>
+                                  <p:childTnLst>
+                                    <p:set>
+                                      <p:cBhvr>
+                                        <p:cTn id="42" dur="1" fill="hold">
+                                          <p:stCondLst>
+                                            <p:cond delay="0"/>
+                                          </p:stCondLst>
+                                        </p:cTn>
+                                        <p:tgtEl>
+                                          <p:spTgt spid="63"/>
+                                        </p:tgtEl>
+                                        <p:attrNameLst>
+                                          <p:attrName>style.visibility</p:attrName>
+                                        </p:attrNameLst>
+                                      </p:cBhvr>
+                                      <p:to>
+                                        <p:strVal val="visible"/>
+                                      </p:to>
+                                    </p:set>
+                                  </p:childTnLst>
+                                </p:cTn>
+                              </p:par>
+                              <p:par>
+                                <p:cTn id="43" presetID="1" presetClass="entr" presetSubtype="0" fill="hold" grpId="0" nodeType="withEffect">
+                                  <p:stCondLst>
+                                    <p:cond delay="0"/>
+                                  </p:stCondLst>
+                                  <p:childTnLst>
+                                    <p:set>
+                                      <p:cBhvr>
+                                        <p:cTn id="44" dur="1" fill="hold">
+                                          <p:stCondLst>
+                                            <p:cond delay="0"/>
+                                          </p:stCondLst>
+                                        </p:cTn>
+                                        <p:tgtEl>
+                                          <p:spTgt spid="58"/>
+                                        </p:tgtEl>
+                                        <p:attrNameLst>
+                                          <p:attrName>style.visibility</p:attrName>
+                                        </p:attrNameLst>
+                                      </p:cBhvr>
+                                      <p:to>
+                                        <p:strVal val="visible"/>
+                                      </p:to>
+                                    </p:set>
+                                  </p:childTnLst>
+                                </p:cTn>
+                              </p:par>
+                              <p:par>
+                                <p:cTn id="45" presetID="1" presetClass="entr" presetSubtype="0" fill="hold" grpId="0" nodeType="withEffect">
+                                  <p:stCondLst>
+                                    <p:cond delay="0"/>
+                                  </p:stCondLst>
+                                  <p:childTnLst>
+                                    <p:set>
+                                      <p:cBhvr>
+                                        <p:cTn id="46" dur="1" fill="hold">
+                                          <p:stCondLst>
+                                            <p:cond delay="0"/>
+                                          </p:stCondLst>
+                                        </p:cTn>
+                                        <p:tgtEl>
+                                          <p:spTgt spid="59"/>
+                                        </p:tgtEl>
+                                        <p:attrNameLst>
+                                          <p:attrName>style.visibility</p:attrName>
+                                        </p:attrNameLst>
+                                      </p:cBhvr>
+                                      <p:to>
+                                        <p:strVal val="visible"/>
+                                      </p:to>
+                                    </p:set>
+                                  </p:childTnLst>
+                                </p:cTn>
+                              </p:par>
+                              <p:par>
+                                <p:cTn id="47" presetID="1" presetClass="entr" presetSubtype="0" fill="hold" grpId="0" nodeType="withEffect">
+                                  <p:stCondLst>
+                                    <p:cond delay="0"/>
+                                  </p:stCondLst>
+                                  <p:childTnLst>
+                                    <p:set>
+                                      <p:cBhvr>
+                                        <p:cTn id="48" dur="1" fill="hold">
+                                          <p:stCondLst>
+                                            <p:cond delay="0"/>
+                                          </p:stCondLst>
+                                        </p:cTn>
+                                        <p:tgtEl>
+                                          <p:spTgt spid="64"/>
+                                        </p:tgtEl>
+                                        <p:attrNameLst>
+                                          <p:attrName>style.visibility</p:attrName>
+                                        </p:attrNameLst>
+                                      </p:cBhvr>
+                                      <p:to>
+                                        <p:strVal val="visible"/>
+                                      </p:to>
+                                    </p:set>
+                                  </p:childTnLst>
+                                </p:cTn>
+                              </p:par>
+                            </p:childTnLst>
+                          </p:cTn>
+                        </p:par>
+                      </p:childTnLst>
+                    </p:cTn>
+                  </p:par>
+                  <p:par>
+                    <p:cTn id="49" fill="hold">
+                      <p:stCondLst>
+                        <p:cond delay="indefinite"/>
+                      </p:stCondLst>
+                      <p:childTnLst>
+                        <p:par>
+                          <p:cTn id="50" fill="hold">
+                            <p:stCondLst>
+                              <p:cond delay="0"/>
+                            </p:stCondLst>
+                            <p:childTnLst>
+                              <p:par>
+                                <p:cTn id="51" presetID="1" presetClass="emph" presetSubtype="2" fill="hold" nodeType="clickEffect">
+                                  <p:stCondLst>
+                                    <p:cond delay="0"/>
+                                  </p:stCondLst>
+                                  <p:childTnLst>
+                                    <p:animClr clrSpc="rgb" dir="cw">
+                                      <p:cBhvr>
+                                        <p:cTn id="52" dur="2000" fill="hold"/>
+                                        <p:tgtEl>
+                                          <p:spTgt spid="64"/>
+                                        </p:tgtEl>
+                                        <p:attrNameLst>
+                                          <p:attrName>fillcolor</p:attrName>
+                                        </p:attrNameLst>
+                                      </p:cBhvr>
+                                      <p:to>
+                                        <a:srgbClr val="E3E3E3"/>
+                                      </p:to>
+                                    </p:animClr>
+                                    <p:set>
+                                      <p:cBhvr>
+                                        <p:cTn id="53" dur="2000" fill="hold"/>
+                                        <p:tgtEl>
+                                          <p:spTgt spid="64"/>
+                                        </p:tgtEl>
+                                        <p:attrNameLst>
+                                          <p:attrName>fill.type</p:attrName>
+                                        </p:attrNameLst>
+                                      </p:cBhvr>
+                                      <p:to>
+                                        <p:strVal val="solid"/>
+                                      </p:to>
+                                    </p:set>
+                                    <p:set>
+                                      <p:cBhvr>
+                                        <p:cTn id="54" dur="2000" fill="hold"/>
+                                        <p:tgtEl>
+                                          <p:spTgt spid="64"/>
+                                        </p:tgtEl>
+                                        <p:attrNameLst>
+                                          <p:attrName>fill.on</p:attrName>
+                                        </p:attrNameLst>
+                                      </p:cBhvr>
+                                      <p:to>
+                                        <p:strVal val="true"/>
+                                      </p:to>
+                                    </p:set>
+                                  </p:childTnLst>
+                                </p:cTn>
+                              </p:par>
+                              <p:par>
+                                <p:cTn id="55" presetID="1" presetClass="entr" presetSubtype="0" fill="hold" grpId="0" nodeType="withEffect">
+                                  <p:stCondLst>
+                                    <p:cond delay="0"/>
+                                  </p:stCondLst>
+                                  <p:childTnLst>
+                                    <p:set>
+                                      <p:cBhvr>
+                                        <p:cTn id="56" dur="1" fill="hold">
+                                          <p:stCondLst>
+                                            <p:cond delay="0"/>
+                                          </p:stCondLst>
+                                        </p:cTn>
+                                        <p:tgtEl>
+                                          <p:spTgt spid="28"/>
+                                        </p:tgtEl>
+                                        <p:attrNameLst>
+                                          <p:attrName>style.visibility</p:attrName>
+                                        </p:attrNameLst>
+                                      </p:cBhvr>
+                                      <p:to>
+                                        <p:strVal val="visible"/>
+                                      </p:to>
+                                    </p:set>
+                                  </p:childTnLst>
+                                </p:cTn>
+                              </p:par>
+                            </p:childTnLst>
+                          </p:cTn>
+                        </p:par>
+                      </p:childTnLst>
+                    </p:cTn>
+                  </p:par>
+                </p:childTnLst>
+              </p:cTn>
+              <p:prevCondLst>
+                <p:cond evt="onPrev" delay="0">
+                  <p:tgtEl>
+                    <p:sldTgt/>
+                  </p:tgtEl>
+                </p:cond>
+              </p:prevCondLst>
+              <p:nextCondLst>
+                <p:cond evt="onNext" delay="0">
+                  <p:tgtEl>
+                    <p:sldTgt/>
+                  </p:tgtEl>
+                </p:cond>
+              </p:nextCondLst>
+            </p:seq>
+          </p:childTnLst>
+        </p:cTn>
       </p:par>
     </p:tnLst>
+    <p:bldLst>
+      <p:bldP spid="63" grpId="0" animBg="1"/>
+      <p:bldP spid="27" grpId="0"/>
+      <p:bldP spid="51" grpId="0" animBg="1"/>
+      <p:bldP spid="11" grpId="0"/>
+      <p:bldP spid="52" grpId="0"/>
+      <p:bldP spid="54" grpId="0"/>
+      <p:bldP spid="56" grpId="0"/>
+      <p:bldP spid="58" grpId="0"/>
+      <p:bldP spid="59" grpId="0"/>
+      <p:bldP spid="62" grpId="0" animBg="1"/>
+      <p:bldP spid="53" grpId="0"/>
+      <p:bldP spid="28" grpId="0" animBg="1"/>
+      <p:bldP spid="64" grpId="0"/>
+    </p:bldLst>
   </p:timing>
 </p:sld>
 </file>
 
-<file path=ppt/slides/slide12.xml><?xml version="1.0" encoding="utf-8"?>
+<file path=ppt/slides/slide13.xml><?xml version="1.0" encoding="utf-8"?>
+<p:sld xmlns:a="http://schemas.openxmlformats.org/drawingml/2006/main" xmlns:r="http://schemas.openxmlformats.org/officeDocument/2006/relationships" xmlns:p="http://schemas.openxmlformats.org/presentationml/2006/main">
+  <p:cSld>
+    <p:spTree>
+      <p:nvGrpSpPr>
+        <p:cNvPr id="1" name=""/>
+        <p:cNvGrpSpPr/>
+        <p:nvPr/>
+      </p:nvGrpSpPr>
+      <p:grpSpPr>
+        <a:xfrm>
+          <a:off x="0" y="0"/>
+          <a:ext cx="0" cy="0"/>
+          <a:chOff x="0" y="0"/>
+          <a:chExt cx="0" cy="0"/>
+        </a:xfrm>
+      </p:grpSpPr>
+      <p:sp>
+        <p:nvSpPr>
+          <p:cNvPr id="62" name="Textfeld 61"/>
+          <p:cNvSpPr txBox="1"/>
+          <p:nvPr/>
+        </p:nvSpPr>
+        <p:spPr>
+          <a:xfrm>
+            <a:off x="251520" y="3068960"/>
+            <a:ext cx="1895046" cy="461665"/>
+          </a:xfrm>
+          <a:prstGeom prst="rect">
+            <a:avLst/>
+          </a:prstGeom>
+          <a:noFill/>
+        </p:spPr>
+        <p:txBody>
+          <a:bodyPr wrap="square" rtlCol="0">
+            <a:spAutoFit/>
+          </a:bodyPr>
+          <a:lstStyle/>
+          <a:p>
+            <a:pPr algn="ctr"/>
+            <a:r>
+              <a:rPr lang="de-DE" sz="1200" b="1" dirty="0" smtClean="0">
+                <a:solidFill>
+                  <a:srgbClr val="0088CC"/>
+                </a:solidFill>
+              </a:rPr>
+              <a:t>Visueller Output (bisher über Konsolenausgabe)</a:t>
+            </a:r>
+            <a:endParaRPr lang="de-DE" sz="1200" b="1" dirty="0">
+              <a:solidFill>
+                <a:srgbClr val="0088CC"/>
+              </a:solidFill>
+            </a:endParaRPr>
+          </a:p>
+        </p:txBody>
+      </p:sp>
+      <p:sp>
+        <p:nvSpPr>
+          <p:cNvPr id="63" name="Richtungspfeil 62"/>
+          <p:cNvSpPr/>
+          <p:nvPr/>
+        </p:nvSpPr>
+        <p:spPr>
+          <a:xfrm rot="5400000">
+            <a:off x="671832" y="3178138"/>
+            <a:ext cx="1054419" cy="1895046"/>
+          </a:xfrm>
+          <a:prstGeom prst="homePlate">
+            <a:avLst/>
+          </a:prstGeom>
+          <a:solidFill>
+            <a:srgbClr val="0088CC"/>
+          </a:solidFill>
+          <a:ln>
+            <a:noFill/>
+          </a:ln>
+        </p:spPr>
+        <p:style>
+          <a:lnRef idx="2">
+            <a:schemeClr val="accent1">
+              <a:shade val="50000"/>
+            </a:schemeClr>
+          </a:lnRef>
+          <a:fillRef idx="1">
+            <a:schemeClr val="accent1"/>
+          </a:fillRef>
+          <a:effectRef idx="0">
+            <a:schemeClr val="accent1"/>
+          </a:effectRef>
+          <a:fontRef idx="minor">
+            <a:schemeClr val="lt1"/>
+          </a:fontRef>
+        </p:style>
+        <p:txBody>
+          <a:bodyPr rtlCol="0" anchor="ctr"/>
+          <a:lstStyle/>
+          <a:p>
+            <a:pPr algn="ctr"/>
+            <a:endParaRPr lang="de-DE" dirty="0">
+              <a:solidFill>
+                <a:schemeClr val="tx1"/>
+              </a:solidFill>
+            </a:endParaRPr>
+          </a:p>
+        </p:txBody>
+      </p:sp>
+      <p:sp>
+        <p:nvSpPr>
+          <p:cNvPr id="61" name="Richtungspfeil 60"/>
+          <p:cNvSpPr/>
+          <p:nvPr/>
+        </p:nvSpPr>
+        <p:spPr>
+          <a:xfrm rot="5400000">
+            <a:off x="671833" y="1594227"/>
+            <a:ext cx="1054419" cy="1895046"/>
+          </a:xfrm>
+          <a:prstGeom prst="homePlate">
+            <a:avLst/>
+          </a:prstGeom>
+          <a:solidFill>
+            <a:srgbClr val="0088CC"/>
+          </a:solidFill>
+          <a:ln>
+            <a:noFill/>
+          </a:ln>
+        </p:spPr>
+        <p:style>
+          <a:lnRef idx="2">
+            <a:schemeClr val="accent1">
+              <a:shade val="50000"/>
+            </a:schemeClr>
+          </a:lnRef>
+          <a:fillRef idx="1">
+            <a:schemeClr val="accent1"/>
+          </a:fillRef>
+          <a:effectRef idx="0">
+            <a:schemeClr val="accent1"/>
+          </a:effectRef>
+          <a:fontRef idx="minor">
+            <a:schemeClr val="lt1"/>
+          </a:fontRef>
+        </p:style>
+        <p:txBody>
+          <a:bodyPr rtlCol="0" anchor="ctr"/>
+          <a:lstStyle/>
+          <a:p>
+            <a:pPr algn="ctr"/>
+            <a:endParaRPr lang="de-DE" dirty="0">
+              <a:solidFill>
+                <a:schemeClr val="tx1"/>
+              </a:solidFill>
+            </a:endParaRPr>
+          </a:p>
+        </p:txBody>
+      </p:sp>
+      <p:sp>
+        <p:nvSpPr>
+          <p:cNvPr id="4" name="Fußzeilenplatzhalter 3"/>
+          <p:cNvSpPr>
+            <a:spLocks noGrp="1"/>
+          </p:cNvSpPr>
+          <p:nvPr>
+            <p:ph type="ftr" sz="quarter" idx="11"/>
+          </p:nvPr>
+        </p:nvSpPr>
+        <p:spPr/>
+        <p:txBody>
+          <a:bodyPr/>
+          <a:lstStyle/>
+          <a:p>
+            <a:r>
+              <a:rPr lang="de-DE" smtClean="0"/>
+              <a:t>Michael Behr, Martin Kampa, Huina Zhu, Betreuer: Johannes Schneider</a:t>
+            </a:r>
+            <a:endParaRPr lang="de-DE"/>
+          </a:p>
+        </p:txBody>
+      </p:sp>
+      <p:sp>
+        <p:nvSpPr>
+          <p:cNvPr id="7" name="Foliennummernplatzhalter 6"/>
+          <p:cNvSpPr>
+            <a:spLocks noGrp="1"/>
+          </p:cNvSpPr>
+          <p:nvPr>
+            <p:ph type="sldNum" sz="quarter" idx="12"/>
+          </p:nvPr>
+        </p:nvSpPr>
+        <p:spPr/>
+        <p:txBody>
+          <a:bodyPr/>
+          <a:lstStyle/>
+          <a:p>
+            <a:fld id="{7FBB16D6-E964-4041-9FFF-CB6ECC1FFCE6}" type="slidenum">
+              <a:rPr lang="de-DE" smtClean="0"/>
+              <a:t>13</a:t>
+            </a:fld>
+            <a:endParaRPr lang="de-DE"/>
+          </a:p>
+        </p:txBody>
+      </p:sp>
+      <p:sp>
+        <p:nvSpPr>
+          <p:cNvPr id="13" name="Textfeld 12"/>
+          <p:cNvSpPr txBox="1"/>
+          <p:nvPr/>
+        </p:nvSpPr>
+        <p:spPr>
+          <a:xfrm>
+            <a:off x="607416" y="796642"/>
+            <a:ext cx="8285065" cy="400110"/>
+          </a:xfrm>
+          <a:prstGeom prst="rect">
+            <a:avLst/>
+          </a:prstGeom>
+          <a:solidFill>
+            <a:schemeClr val="bg1"/>
+          </a:solidFill>
+        </p:spPr>
+        <p:txBody>
+          <a:bodyPr wrap="square" rtlCol="0">
+            <a:spAutoFit/>
+          </a:bodyPr>
+          <a:lstStyle/>
+          <a:p>
+            <a:pPr algn="r"/>
+            <a:r>
+              <a:rPr lang="de-DE" sz="2000" b="1" dirty="0" smtClean="0">
+                <a:solidFill>
+                  <a:schemeClr val="bg1">
+                    <a:lumMod val="65000"/>
+                  </a:schemeClr>
+                </a:solidFill>
+                <a:latin typeface="Helvetica" panose="020B0604020202020204" pitchFamily="34" charset="0"/>
+                <a:cs typeface="Helvetica" panose="020B0604020202020204" pitchFamily="34" charset="0"/>
+              </a:rPr>
+              <a:t>4. Einblick Umsetzung </a:t>
+            </a:r>
+            <a:r>
+              <a:rPr lang="de-DE" sz="2000" b="1" dirty="0" smtClean="0">
+                <a:solidFill>
+                  <a:schemeClr val="bg1">
+                    <a:lumMod val="65000"/>
+                  </a:schemeClr>
+                </a:solidFill>
+                <a:latin typeface="Helvetica" panose="020B0604020202020204" pitchFamily="34" charset="0"/>
+                <a:cs typeface="Helvetica" panose="020B0604020202020204" pitchFamily="34" charset="0"/>
+              </a:rPr>
+              <a:t>– Grobes Vorgehen</a:t>
+            </a:r>
+            <a:endParaRPr lang="de-DE" sz="2000" b="1" dirty="0">
+              <a:solidFill>
+                <a:schemeClr val="bg1">
+                  <a:lumMod val="65000"/>
+                </a:schemeClr>
+              </a:solidFill>
+              <a:latin typeface="Helvetica" panose="020B0604020202020204" pitchFamily="34" charset="0"/>
+              <a:cs typeface="Helvetica" panose="020B0604020202020204" pitchFamily="34" charset="0"/>
+            </a:endParaRPr>
+          </a:p>
+        </p:txBody>
+      </p:sp>
+      <p:sp>
+        <p:nvSpPr>
+          <p:cNvPr id="11" name="Textfeld 10"/>
+          <p:cNvSpPr txBox="1"/>
+          <p:nvPr/>
+        </p:nvSpPr>
+        <p:spPr>
+          <a:xfrm>
+            <a:off x="251519" y="2143889"/>
+            <a:ext cx="1895047" cy="276999"/>
+          </a:xfrm>
+          <a:prstGeom prst="rect">
+            <a:avLst/>
+          </a:prstGeom>
+          <a:noFill/>
+        </p:spPr>
+        <p:txBody>
+          <a:bodyPr wrap="square" rtlCol="0">
+            <a:spAutoFit/>
+          </a:bodyPr>
+          <a:lstStyle/>
+          <a:p>
+            <a:pPr algn="ctr"/>
+            <a:r>
+              <a:rPr lang="de-DE" sz="1200" b="1" dirty="0" smtClean="0">
+                <a:solidFill>
+                  <a:schemeClr val="bg1"/>
+                </a:solidFill>
+              </a:rPr>
+              <a:t>Visualisierungen erstellen</a:t>
+            </a:r>
+            <a:endParaRPr lang="de-DE" sz="1200" b="1" dirty="0">
+              <a:solidFill>
+                <a:schemeClr val="bg1"/>
+              </a:solidFill>
+            </a:endParaRPr>
+          </a:p>
+        </p:txBody>
+      </p:sp>
+      <p:sp>
+        <p:nvSpPr>
+          <p:cNvPr id="53" name="Textfeld 52"/>
+          <p:cNvSpPr txBox="1"/>
+          <p:nvPr/>
+        </p:nvSpPr>
+        <p:spPr>
+          <a:xfrm>
+            <a:off x="251520" y="3671148"/>
+            <a:ext cx="1895046" cy="461665"/>
+          </a:xfrm>
+          <a:prstGeom prst="rect">
+            <a:avLst/>
+          </a:prstGeom>
+          <a:noFill/>
+        </p:spPr>
+        <p:txBody>
+          <a:bodyPr wrap="square" rtlCol="0">
+            <a:spAutoFit/>
+          </a:bodyPr>
+          <a:lstStyle/>
+          <a:p>
+            <a:pPr algn="ctr"/>
+            <a:r>
+              <a:rPr lang="de-DE" sz="1200" b="1" dirty="0" smtClean="0">
+                <a:solidFill>
+                  <a:schemeClr val="bg1"/>
+                </a:solidFill>
+              </a:rPr>
+              <a:t>Ergebnisse über einzelne Goals zugänglich machen</a:t>
+            </a:r>
+            <a:endParaRPr lang="de-DE" sz="1200" b="1" dirty="0">
+              <a:solidFill>
+                <a:schemeClr val="bg1"/>
+              </a:solidFill>
+            </a:endParaRPr>
+          </a:p>
+        </p:txBody>
+      </p:sp>
+      <p:sp>
+        <p:nvSpPr>
+          <p:cNvPr id="60" name="Textfeld 59"/>
+          <p:cNvSpPr txBox="1"/>
+          <p:nvPr/>
+        </p:nvSpPr>
+        <p:spPr>
+          <a:xfrm>
+            <a:off x="240537" y="1412776"/>
+            <a:ext cx="1895047" cy="461665"/>
+          </a:xfrm>
+          <a:prstGeom prst="rect">
+            <a:avLst/>
+          </a:prstGeom>
+          <a:solidFill>
+            <a:srgbClr val="E3E3E3"/>
+          </a:solidFill>
+        </p:spPr>
+        <p:txBody>
+          <a:bodyPr wrap="square" rtlCol="0">
+            <a:spAutoFit/>
+          </a:bodyPr>
+          <a:lstStyle/>
+          <a:p>
+            <a:pPr algn="ctr"/>
+            <a:r>
+              <a:rPr lang="de-DE" sz="1200" b="1" dirty="0" smtClean="0">
+                <a:solidFill>
+                  <a:srgbClr val="0088CC"/>
+                </a:solidFill>
+              </a:rPr>
+              <a:t>Graph aus angereicherten Wrapper-Klassen</a:t>
+            </a:r>
+            <a:endParaRPr lang="de-DE" sz="1200" b="1" dirty="0">
+              <a:solidFill>
+                <a:srgbClr val="0088CC"/>
+              </a:solidFill>
+            </a:endParaRPr>
+          </a:p>
+        </p:txBody>
+      </p:sp>
+      <p:sp>
+        <p:nvSpPr>
+          <p:cNvPr id="64" name="Textfeld 63"/>
+          <p:cNvSpPr txBox="1"/>
+          <p:nvPr/>
+        </p:nvSpPr>
+        <p:spPr>
+          <a:xfrm>
+            <a:off x="2397108" y="1988840"/>
+            <a:ext cx="6351356" cy="738664"/>
+          </a:xfrm>
+          <a:prstGeom prst="rect">
+            <a:avLst/>
+          </a:prstGeom>
+          <a:noFill/>
+        </p:spPr>
+        <p:txBody>
+          <a:bodyPr wrap="square" rtlCol="0">
+            <a:spAutoFit/>
+          </a:bodyPr>
+          <a:lstStyle/>
+          <a:p>
+            <a:r>
+              <a:rPr lang="de-DE" sz="1400" dirty="0" smtClean="0">
+                <a:latin typeface="Helvetica" panose="020B0604020202020204" pitchFamily="34" charset="0"/>
+                <a:cs typeface="Helvetica" panose="020B0604020202020204" pitchFamily="34" charset="0"/>
+              </a:rPr>
+              <a:t>Visualisierungen für unterschiedliche Ziele (Listendarstellung, Baumdarstellung), durch Extraktion der benötigten Information aus den entsprechenden  Wrapper-Klassen </a:t>
+            </a:r>
+            <a:endParaRPr lang="de-DE" sz="1400" dirty="0">
+              <a:latin typeface="Helvetica" panose="020B0604020202020204" pitchFamily="34" charset="0"/>
+              <a:cs typeface="Helvetica" panose="020B0604020202020204" pitchFamily="34" charset="0"/>
+            </a:endParaRPr>
+          </a:p>
+        </p:txBody>
+      </p:sp>
+      <p:sp>
+        <p:nvSpPr>
+          <p:cNvPr id="65" name="Textfeld 64"/>
+          <p:cNvSpPr txBox="1"/>
+          <p:nvPr/>
+        </p:nvSpPr>
+        <p:spPr>
+          <a:xfrm>
+            <a:off x="2392710" y="3573016"/>
+            <a:ext cx="6351356" cy="1169551"/>
+          </a:xfrm>
+          <a:prstGeom prst="rect">
+            <a:avLst/>
+          </a:prstGeom>
+          <a:noFill/>
+        </p:spPr>
+        <p:txBody>
+          <a:bodyPr wrap="square" rtlCol="0">
+            <a:spAutoFit/>
+          </a:bodyPr>
+          <a:lstStyle/>
+          <a:p>
+            <a:r>
+              <a:rPr lang="de-DE" sz="1400" dirty="0" smtClean="0">
+                <a:latin typeface="Helvetica" panose="020B0604020202020204" pitchFamily="34" charset="0"/>
+                <a:cs typeface="Helvetica" panose="020B0604020202020204" pitchFamily="34" charset="0"/>
+              </a:rPr>
+              <a:t>Für jedes Goal (</a:t>
+            </a:r>
+            <a:r>
+              <a:rPr lang="de-DE" sz="1400" dirty="0" err="1" smtClean="0">
+                <a:latin typeface="Helvetica" panose="020B0604020202020204" pitchFamily="34" charset="0"/>
+                <a:cs typeface="Helvetica" panose="020B0604020202020204" pitchFamily="34" charset="0"/>
+              </a:rPr>
+              <a:t>Pluginfunktion</a:t>
+            </a:r>
+            <a:r>
+              <a:rPr lang="de-DE" sz="1400" dirty="0" smtClean="0">
+                <a:latin typeface="Helvetica" panose="020B0604020202020204" pitchFamily="34" charset="0"/>
+                <a:cs typeface="Helvetica" panose="020B0604020202020204" pitchFamily="34" charset="0"/>
+              </a:rPr>
+              <a:t>) eigene Klasse schreiben, die </a:t>
+            </a:r>
+            <a:r>
+              <a:rPr lang="de-DE" sz="1400" dirty="0" err="1" smtClean="0">
+                <a:latin typeface="Helvetica" panose="020B0604020202020204" pitchFamily="34" charset="0"/>
+                <a:cs typeface="Helvetica" panose="020B0604020202020204" pitchFamily="34" charset="0"/>
+              </a:rPr>
+              <a:t>AbstractMojo</a:t>
+            </a:r>
+            <a:r>
+              <a:rPr lang="de-DE" sz="1400" dirty="0" smtClean="0">
+                <a:latin typeface="Helvetica" panose="020B0604020202020204" pitchFamily="34" charset="0"/>
+                <a:cs typeface="Helvetica" panose="020B0604020202020204" pitchFamily="34" charset="0"/>
+              </a:rPr>
+              <a:t> der Maven-Plugin API erweitert. </a:t>
+            </a:r>
+          </a:p>
+          <a:p>
+            <a:endParaRPr lang="de-DE" sz="1400" dirty="0" smtClean="0">
+              <a:latin typeface="Helvetica" panose="020B0604020202020204" pitchFamily="34" charset="0"/>
+              <a:cs typeface="Helvetica" panose="020B0604020202020204" pitchFamily="34" charset="0"/>
+            </a:endParaRPr>
+          </a:p>
+          <a:p>
+            <a:r>
+              <a:rPr lang="de-DE" sz="1400" dirty="0" smtClean="0">
+                <a:latin typeface="Helvetica" panose="020B0604020202020204" pitchFamily="34" charset="0"/>
+                <a:cs typeface="Helvetica" panose="020B0604020202020204" pitchFamily="34" charset="0"/>
+              </a:rPr>
+              <a:t>Über Klassen-Annotation (@</a:t>
+            </a:r>
+            <a:r>
+              <a:rPr lang="de-DE" sz="1400" dirty="0" err="1" smtClean="0">
+                <a:latin typeface="Helvetica" panose="020B0604020202020204" pitchFamily="34" charset="0"/>
+                <a:cs typeface="Helvetica" panose="020B0604020202020204" pitchFamily="34" charset="0"/>
+              </a:rPr>
+              <a:t>Mojo</a:t>
+            </a:r>
+            <a:r>
+              <a:rPr lang="de-DE" sz="1400" dirty="0" smtClean="0">
+                <a:latin typeface="Helvetica" panose="020B0604020202020204" pitchFamily="34" charset="0"/>
+                <a:cs typeface="Helvetica" panose="020B0604020202020204" pitchFamily="34" charset="0"/>
+              </a:rPr>
+              <a:t>) als </a:t>
+            </a:r>
+            <a:r>
+              <a:rPr lang="de-DE" sz="1400" dirty="0" err="1" smtClean="0">
+                <a:latin typeface="Helvetica" panose="020B0604020202020204" pitchFamily="34" charset="0"/>
+                <a:cs typeface="Helvetica" panose="020B0604020202020204" pitchFamily="34" charset="0"/>
+              </a:rPr>
+              <a:t>Mojo</a:t>
+            </a:r>
+            <a:r>
+              <a:rPr lang="de-DE" sz="1400" dirty="0" smtClean="0">
+                <a:latin typeface="Helvetica" panose="020B0604020202020204" pitchFamily="34" charset="0"/>
+                <a:cs typeface="Helvetica" panose="020B0604020202020204" pitchFamily="34" charset="0"/>
+              </a:rPr>
+              <a:t> (</a:t>
+            </a:r>
+            <a:r>
+              <a:rPr lang="en-US" sz="1400" dirty="0">
+                <a:latin typeface="Helvetica" panose="020B0604020202020204" pitchFamily="34" charset="0"/>
+                <a:cs typeface="Helvetica" panose="020B0604020202020204" pitchFamily="34" charset="0"/>
+              </a:rPr>
+              <a:t>Maven plain Old Java Object</a:t>
+            </a:r>
+            <a:r>
+              <a:rPr lang="de-DE" sz="1400" dirty="0" smtClean="0">
+                <a:latin typeface="Helvetica" panose="020B0604020202020204" pitchFamily="34" charset="0"/>
+                <a:cs typeface="Helvetica" panose="020B0604020202020204" pitchFamily="34" charset="0"/>
+              </a:rPr>
+              <a:t>) registrieren.</a:t>
+            </a:r>
+            <a:endParaRPr lang="de-DE" sz="1400" dirty="0">
+              <a:latin typeface="Helvetica" panose="020B0604020202020204" pitchFamily="34" charset="0"/>
+              <a:cs typeface="Helvetica" panose="020B0604020202020204" pitchFamily="34" charset="0"/>
+            </a:endParaRPr>
+          </a:p>
+        </p:txBody>
+      </p:sp>
+    </p:spTree>
+    <p:extLst>
+      <p:ext uri="{BB962C8B-B14F-4D97-AF65-F5344CB8AC3E}">
+        <p14:creationId xmlns:p14="http://schemas.microsoft.com/office/powerpoint/2010/main" val="283667146"/>
+      </p:ext>
+    </p:extLst>
+  </p:cSld>
+  <p:clrMapOvr>
+    <a:masterClrMapping/>
+  </p:clrMapOvr>
+  <p:timing>
+    <p:tnLst>
+      <p:par>
+        <p:cTn id="1" dur="indefinite" restart="never" nodeType="tmRoot">
+          <p:childTnLst>
+            <p:seq concurrent="1" nextAc="seek">
+              <p:cTn id="2" dur="indefinite" nodeType="mainSeq">
+                <p:childTnLst>
+                  <p:par>
+                    <p:cTn id="3" fill="hold">
+                      <p:stCondLst>
+                        <p:cond delay="indefinite"/>
+                      </p:stCondLst>
+                      <p:childTnLst>
+                        <p:par>
+                          <p:cTn id="4" fill="hold">
+                            <p:stCondLst>
+                              <p:cond delay="0"/>
+                            </p:stCondLst>
+                            <p:childTnLst>
+                              <p:par>
+                                <p:cTn id="5" presetID="1" presetClass="entr" presetSubtype="0" fill="hold" grpId="0" nodeType="clickEffect">
+                                  <p:stCondLst>
+                                    <p:cond delay="0"/>
+                                  </p:stCondLst>
+                                  <p:childTnLst>
+                                    <p:set>
+                                      <p:cBhvr>
+                                        <p:cTn id="6" dur="1" fill="hold">
+                                          <p:stCondLst>
+                                            <p:cond delay="0"/>
+                                          </p:stCondLst>
+                                        </p:cTn>
+                                        <p:tgtEl>
+                                          <p:spTgt spid="62"/>
+                                        </p:tgtEl>
+                                        <p:attrNameLst>
+                                          <p:attrName>style.visibility</p:attrName>
+                                        </p:attrNameLst>
+                                      </p:cBhvr>
+                                      <p:to>
+                                        <p:strVal val="visible"/>
+                                      </p:to>
+                                    </p:set>
+                                  </p:childTnLst>
+                                </p:cTn>
+                              </p:par>
+                              <p:par>
+                                <p:cTn id="7" presetID="1" presetClass="entr" presetSubtype="0" fill="hold" grpId="0" nodeType="withEffect">
+                                  <p:stCondLst>
+                                    <p:cond delay="0"/>
+                                  </p:stCondLst>
+                                  <p:childTnLst>
+                                    <p:set>
+                                      <p:cBhvr>
+                                        <p:cTn id="8" dur="1" fill="hold">
+                                          <p:stCondLst>
+                                            <p:cond delay="0"/>
+                                          </p:stCondLst>
+                                        </p:cTn>
+                                        <p:tgtEl>
+                                          <p:spTgt spid="61"/>
+                                        </p:tgtEl>
+                                        <p:attrNameLst>
+                                          <p:attrName>style.visibility</p:attrName>
+                                        </p:attrNameLst>
+                                      </p:cBhvr>
+                                      <p:to>
+                                        <p:strVal val="visible"/>
+                                      </p:to>
+                                    </p:set>
+                                  </p:childTnLst>
+                                </p:cTn>
+                              </p:par>
+                              <p:par>
+                                <p:cTn id="9" presetID="1" presetClass="entr" presetSubtype="0" fill="hold" grpId="0" nodeType="withEffect">
+                                  <p:stCondLst>
+                                    <p:cond delay="0"/>
+                                  </p:stCondLst>
+                                  <p:childTnLst>
+                                    <p:set>
+                                      <p:cBhvr>
+                                        <p:cTn id="10" dur="1" fill="hold">
+                                          <p:stCondLst>
+                                            <p:cond delay="0"/>
+                                          </p:stCondLst>
+                                        </p:cTn>
+                                        <p:tgtEl>
+                                          <p:spTgt spid="11"/>
+                                        </p:tgtEl>
+                                        <p:attrNameLst>
+                                          <p:attrName>style.visibility</p:attrName>
+                                        </p:attrNameLst>
+                                      </p:cBhvr>
+                                      <p:to>
+                                        <p:strVal val="visible"/>
+                                      </p:to>
+                                    </p:set>
+                                  </p:childTnLst>
+                                </p:cTn>
+                              </p:par>
+                              <p:par>
+                                <p:cTn id="11" presetID="1" presetClass="entr" presetSubtype="0" fill="hold" grpId="0" nodeType="withEffect">
+                                  <p:stCondLst>
+                                    <p:cond delay="0"/>
+                                  </p:stCondLst>
+                                  <p:childTnLst>
+                                    <p:set>
+                                      <p:cBhvr>
+                                        <p:cTn id="12" dur="1" fill="hold">
+                                          <p:stCondLst>
+                                            <p:cond delay="0"/>
+                                          </p:stCondLst>
+                                        </p:cTn>
+                                        <p:tgtEl>
+                                          <p:spTgt spid="64"/>
+                                        </p:tgtEl>
+                                        <p:attrNameLst>
+                                          <p:attrName>style.visibility</p:attrName>
+                                        </p:attrNameLst>
+                                      </p:cBhvr>
+                                      <p:to>
+                                        <p:strVal val="visible"/>
+                                      </p:to>
+                                    </p:set>
+                                  </p:childTnLst>
+                                </p:cTn>
+                              </p:par>
+                            </p:childTnLst>
+                          </p:cTn>
+                        </p:par>
+                      </p:childTnLst>
+                    </p:cTn>
+                  </p:par>
+                  <p:par>
+                    <p:cTn id="13" fill="hold">
+                      <p:stCondLst>
+                        <p:cond delay="indefinite"/>
+                      </p:stCondLst>
+                      <p:childTnLst>
+                        <p:par>
+                          <p:cTn id="14" fill="hold">
+                            <p:stCondLst>
+                              <p:cond delay="0"/>
+                            </p:stCondLst>
+                            <p:childTnLst>
+                              <p:par>
+                                <p:cTn id="15" presetID="1" presetClass="entr" presetSubtype="0" fill="hold" grpId="0" nodeType="clickEffect">
+                                  <p:stCondLst>
+                                    <p:cond delay="0"/>
+                                  </p:stCondLst>
+                                  <p:childTnLst>
+                                    <p:set>
+                                      <p:cBhvr>
+                                        <p:cTn id="16" dur="1" fill="hold">
+                                          <p:stCondLst>
+                                            <p:cond delay="0"/>
+                                          </p:stCondLst>
+                                        </p:cTn>
+                                        <p:tgtEl>
+                                          <p:spTgt spid="63"/>
+                                        </p:tgtEl>
+                                        <p:attrNameLst>
+                                          <p:attrName>style.visibility</p:attrName>
+                                        </p:attrNameLst>
+                                      </p:cBhvr>
+                                      <p:to>
+                                        <p:strVal val="visible"/>
+                                      </p:to>
+                                    </p:set>
+                                  </p:childTnLst>
+                                </p:cTn>
+                              </p:par>
+                              <p:par>
+                                <p:cTn id="17" presetID="1" presetClass="entr" presetSubtype="0" fill="hold" grpId="0" nodeType="withEffect">
+                                  <p:stCondLst>
+                                    <p:cond delay="0"/>
+                                  </p:stCondLst>
+                                  <p:childTnLst>
+                                    <p:set>
+                                      <p:cBhvr>
+                                        <p:cTn id="18" dur="1" fill="hold">
+                                          <p:stCondLst>
+                                            <p:cond delay="0"/>
+                                          </p:stCondLst>
+                                        </p:cTn>
+                                        <p:tgtEl>
+                                          <p:spTgt spid="53"/>
+                                        </p:tgtEl>
+                                        <p:attrNameLst>
+                                          <p:attrName>style.visibility</p:attrName>
+                                        </p:attrNameLst>
+                                      </p:cBhvr>
+                                      <p:to>
+                                        <p:strVal val="visible"/>
+                                      </p:to>
+                                    </p:set>
+                                  </p:childTnLst>
+                                </p:cTn>
+                              </p:par>
+                              <p:par>
+                                <p:cTn id="19" presetID="1" presetClass="entr" presetSubtype="0" fill="hold" grpId="0" nodeType="withEffect">
+                                  <p:stCondLst>
+                                    <p:cond delay="0"/>
+                                  </p:stCondLst>
+                                  <p:childTnLst>
+                                    <p:set>
+                                      <p:cBhvr>
+                                        <p:cTn id="20" dur="1" fill="hold">
+                                          <p:stCondLst>
+                                            <p:cond delay="0"/>
+                                          </p:stCondLst>
+                                        </p:cTn>
+                                        <p:tgtEl>
+                                          <p:spTgt spid="65"/>
+                                        </p:tgtEl>
+                                        <p:attrNameLst>
+                                          <p:attrName>style.visibility</p:attrName>
+                                        </p:attrNameLst>
+                                      </p:cBhvr>
+                                      <p:to>
+                                        <p:strVal val="visible"/>
+                                      </p:to>
+                                    </p:set>
+                                  </p:childTnLst>
+                                </p:cTn>
+                              </p:par>
+                            </p:childTnLst>
+                          </p:cTn>
+                        </p:par>
+                      </p:childTnLst>
+                    </p:cTn>
+                  </p:par>
+                </p:childTnLst>
+              </p:cTn>
+              <p:prevCondLst>
+                <p:cond evt="onPrev" delay="0">
+                  <p:tgtEl>
+                    <p:sldTgt/>
+                  </p:tgtEl>
+                </p:cond>
+              </p:prevCondLst>
+              <p:nextCondLst>
+                <p:cond evt="onNext" delay="0">
+                  <p:tgtEl>
+                    <p:sldTgt/>
+                  </p:tgtEl>
+                </p:cond>
+              </p:nextCondLst>
+            </p:seq>
+          </p:childTnLst>
+        </p:cTn>
+      </p:par>
+    </p:tnLst>
+    <p:bldLst>
+      <p:bldP spid="62" grpId="0"/>
+      <p:bldP spid="63" grpId="0" animBg="1"/>
+      <p:bldP spid="61" grpId="0" animBg="1"/>
+      <p:bldP spid="11" grpId="0"/>
+      <p:bldP spid="53" grpId="0"/>
+      <p:bldP spid="64" grpId="0"/>
+      <p:bldP spid="65" grpId="0"/>
+    </p:bldLst>
+  </p:timing>
+</p:sld>
+</file>
+
+<file path=ppt/slides/slide14.xml><?xml version="1.0" encoding="utf-8"?>
 <p:sld xmlns:a="http://schemas.openxmlformats.org/drawingml/2006/main" xmlns:r="http://schemas.openxmlformats.org/officeDocument/2006/relationships" xmlns:p="http://schemas.openxmlformats.org/presentationml/2006/main">
   <p:cSld>
     <p:spTree>
@@ -15623,7 +17901,7 @@
           <a:p>
             <a:fld id="{7FBB16D6-E964-4041-9FFF-CB6ECC1FFCE6}" type="slidenum">
               <a:rPr lang="de-DE" smtClean="0"/>
-              <a:t>12</a:t>
+              <a:t>14</a:t>
             </a:fld>
             <a:endParaRPr lang="de-DE"/>
           </a:p>
@@ -15704,7 +17982,7 @@
       </p:sp>
       <p:pic>
         <p:nvPicPr>
-          <p:cNvPr id="6" name="Picture 2"/>
+          <p:cNvPr id="2050" name="Picture 2"/>
           <p:cNvPicPr>
             <a:picLocks noChangeAspect="1" noChangeArrowheads="1"/>
           </p:cNvPicPr>
@@ -15725,8 +18003,8 @@
         </p:blipFill>
         <p:spPr bwMode="auto">
           <a:xfrm>
-            <a:off x="681038" y="1466056"/>
-            <a:ext cx="7781925" cy="4267200"/>
+            <a:off x="971600" y="1314855"/>
+            <a:ext cx="7250956" cy="4778441"/>
           </a:xfrm>
           <a:prstGeom prst="rect">
             <a:avLst/>
@@ -15776,7 +18054,7 @@
 </p:sld>
 </file>
 
-<file path=ppt/slides/slide13.xml><?xml version="1.0" encoding="utf-8"?>
+<file path=ppt/slides/slide15.xml><?xml version="1.0" encoding="utf-8"?>
 <p:sld xmlns:a="http://schemas.openxmlformats.org/drawingml/2006/main" xmlns:r="http://schemas.openxmlformats.org/officeDocument/2006/relationships" xmlns:p="http://schemas.openxmlformats.org/presentationml/2006/main">
   <p:cSld>
     <p:spTree>
@@ -15833,7 +18111,7 @@
           <a:p>
             <a:fld id="{7FBB16D6-E964-4041-9FFF-CB6ECC1FFCE6}" type="slidenum">
               <a:rPr lang="de-DE" smtClean="0"/>
-              <a:t>13</a:t>
+              <a:t>15</a:t>
             </a:fld>
             <a:endParaRPr lang="de-DE"/>
           </a:p>
@@ -15914,7 +18192,7 @@
       </p:sp>
       <p:pic>
         <p:nvPicPr>
-          <p:cNvPr id="8" name="Picture 2"/>
+          <p:cNvPr id="1026" name="Picture 2"/>
           <p:cNvPicPr>
             <a:picLocks noChangeAspect="1" noChangeArrowheads="1"/>
           </p:cNvPicPr>
@@ -15935,8 +18213,8 @@
         </p:blipFill>
         <p:spPr bwMode="auto">
           <a:xfrm>
-            <a:off x="649958" y="1700808"/>
-            <a:ext cx="7858125" cy="3971925"/>
+            <a:off x="976511" y="1268760"/>
+            <a:ext cx="7272102" cy="4392488"/>
           </a:xfrm>
           <a:prstGeom prst="rect">
             <a:avLst/>
@@ -15986,7 +18264,7 @@
 </p:sld>
 </file>
 
-<file path=ppt/slides/slide14.xml><?xml version="1.0" encoding="utf-8"?>
+<file path=ppt/slides/slide16.xml><?xml version="1.0" encoding="utf-8"?>
 <p:sld xmlns:a="http://schemas.openxmlformats.org/drawingml/2006/main" xmlns:r="http://schemas.openxmlformats.org/officeDocument/2006/relationships" xmlns:p="http://schemas.openxmlformats.org/presentationml/2006/main">
   <p:cSld>
     <p:spTree>
@@ -16043,7 +18321,7 @@
           <a:p>
             <a:fld id="{7FBB16D6-E964-4041-9FFF-CB6ECC1FFCE6}" type="slidenum">
               <a:rPr lang="de-DE" smtClean="0"/>
-              <a:t>14</a:t>
+              <a:t>16</a:t>
             </a:fld>
             <a:endParaRPr lang="de-DE"/>
           </a:p>
@@ -18030,7 +20308,7 @@
 </p:sld>
 </file>
 
-<file path=ppt/slides/slide15.xml><?xml version="1.0" encoding="utf-8"?>
+<file path=ppt/slides/slide17.xml><?xml version="1.0" encoding="utf-8"?>
 <p:sld xmlns:a="http://schemas.openxmlformats.org/drawingml/2006/main" xmlns:r="http://schemas.openxmlformats.org/officeDocument/2006/relationships" xmlns:p="http://schemas.openxmlformats.org/presentationml/2006/main">
   <p:cSld>
     <p:spTree>
@@ -18087,7 +20365,7 @@
           <a:p>
             <a:fld id="{7FBB16D6-E964-4041-9FFF-CB6ECC1FFCE6}" type="slidenum">
               <a:rPr lang="de-DE" smtClean="0"/>
-              <a:t>15</a:t>
+              <a:t>17</a:t>
             </a:fld>
             <a:endParaRPr lang="de-DE"/>
           </a:p>
@@ -18184,7 +20462,7 @@
 </p:sld>
 </file>
 
-<file path=ppt/slides/slide16.xml><?xml version="1.0" encoding="utf-8"?>
+<file path=ppt/slides/slide18.xml><?xml version="1.0" encoding="utf-8"?>
 <p:sld xmlns:a="http://schemas.openxmlformats.org/drawingml/2006/main" xmlns:r="http://schemas.openxmlformats.org/officeDocument/2006/relationships" xmlns:p="http://schemas.openxmlformats.org/presentationml/2006/main">
   <p:cSld>
     <p:spTree>
@@ -18241,7 +20519,7 @@
           <a:p>
             <a:fld id="{7FBB16D6-E964-4041-9FFF-CB6ECC1FFCE6}" type="slidenum">
               <a:rPr lang="de-DE" smtClean="0"/>
-              <a:t>16</a:t>
+              <a:t>18</a:t>
             </a:fld>
             <a:endParaRPr lang="de-DE"/>
           </a:p>
@@ -18338,7 +20616,7 @@
 </p:sld>
 </file>
 
-<file path=ppt/slides/slide17.xml><?xml version="1.0" encoding="utf-8"?>
+<file path=ppt/slides/slide19.xml><?xml version="1.0" encoding="utf-8"?>
 <p:sld xmlns:a="http://schemas.openxmlformats.org/drawingml/2006/main" xmlns:r="http://schemas.openxmlformats.org/officeDocument/2006/relationships" xmlns:p="http://schemas.openxmlformats.org/presentationml/2006/main">
   <p:cSld>
     <p:spTree>
@@ -18395,7 +20673,7 @@
           <a:p>
             <a:fld id="{7FBB16D6-E964-4041-9FFF-CB6ECC1FFCE6}" type="slidenum">
               <a:rPr lang="de-DE" smtClean="0"/>
-              <a:t>17</a:t>
+              <a:t>19</a:t>
             </a:fld>
             <a:endParaRPr lang="de-DE"/>
           </a:p>

</xml_diff>

<commit_message>
edited page in presentation
</commit_message>
<xml_diff>
--- a/presentation/Jahresprojekt Zwischenpräsentation.pptx
+++ b/presentation/Jahresprojekt Zwischenpräsentation.pptx
@@ -2513,7 +2513,17 @@
               <a:latin typeface="Helvetica" panose="020B0604020202020204" pitchFamily="34" charset="0"/>
               <a:cs typeface="Helvetica" panose="020B0604020202020204" pitchFamily="34" charset="0"/>
             </a:rPr>
-            <a:t>Listendarstellung aller Abhängigkeiten mit </a:t>
+            <a:t>Listendarstellung der </a:t>
+          </a:r>
+          <a:r>
+            <a:rPr lang="de-DE" b="1" dirty="0" smtClean="0">
+              <a:solidFill>
+                <a:schemeClr val="bg1"/>
+              </a:solidFill>
+              <a:latin typeface="Helvetica" panose="020B0604020202020204" pitchFamily="34" charset="0"/>
+              <a:cs typeface="Helvetica" panose="020B0604020202020204" pitchFamily="34" charset="0"/>
+            </a:rPr>
+            <a:t>Abhängigkeiten mit </a:t>
           </a:r>
           <a:r>
             <a:rPr lang="de-DE" b="1" dirty="0" err="1" smtClean="0">
@@ -2850,20 +2860,20 @@
   </dgm:ptLst>
   <dgm:cxnLst>
     <dgm:cxn modelId="{99AC8C85-3038-433F-9FF4-E7FBC269B650}" type="presOf" srcId="{EB4AF810-5F27-4424-953F-6E745857D154}" destId="{BCA768C0-63D7-47D8-A8BE-C28A109E6D5F}" srcOrd="1" destOrd="0" presId="urn:microsoft.com/office/officeart/2005/8/layout/matrix1"/>
+    <dgm:cxn modelId="{23D60C62-1061-4D8C-A1D3-653B6F882282}" type="presOf" srcId="{1CDE512A-6BED-45E4-A160-0C3D6737D9F3}" destId="{9A1B30D4-02A5-4672-9C99-D97316359BFB}" srcOrd="1" destOrd="0" presId="urn:microsoft.com/office/officeart/2005/8/layout/matrix1"/>
+    <dgm:cxn modelId="{156A6987-62C9-4821-9DCD-8227ECD93749}" type="presOf" srcId="{1237DFD6-0265-4E66-87D0-86B251C30F0D}" destId="{7C3AC0F8-C2A8-4D6A-B303-DFE85396908E}" srcOrd="0" destOrd="0" presId="urn:microsoft.com/office/officeart/2005/8/layout/matrix1"/>
+    <dgm:cxn modelId="{45D4AB65-1C40-4572-AD23-59C006F8BBBE}" type="presOf" srcId="{1CDE512A-6BED-45E4-A160-0C3D6737D9F3}" destId="{80A4CC39-7938-4EBF-BDB4-2D9237597EDA}" srcOrd="0" destOrd="0" presId="urn:microsoft.com/office/officeart/2005/8/layout/matrix1"/>
+    <dgm:cxn modelId="{8D7CEFE0-90DB-4DCD-95CB-3BE1994B98A0}" type="presOf" srcId="{A6377181-3A36-4C51-A15D-4B7E94D00FA0}" destId="{96227F7B-7EDE-413C-8E0D-D3C68CB157D4}" srcOrd="0" destOrd="0" presId="urn:microsoft.com/office/officeart/2005/8/layout/matrix1"/>
+    <dgm:cxn modelId="{B23B4867-79B3-4075-8926-88BA0545E3D3}" srcId="{A9390F88-A7A7-4C4D-89FF-1A78BBC8603B}" destId="{A6377181-3A36-4C51-A15D-4B7E94D00FA0}" srcOrd="0" destOrd="0" parTransId="{84154685-CCE4-4874-9D3E-EC906AA33513}" sibTransId="{6834B7DA-C6E1-42C8-9CF6-DC8897E558A9}"/>
+    <dgm:cxn modelId="{40777F0C-AFD2-4CCE-8AEA-864EECC35E15}" type="presOf" srcId="{EB4AF810-5F27-4424-953F-6E745857D154}" destId="{D2FE0942-737C-40CE-B352-72439F8F9C68}" srcOrd="0" destOrd="0" presId="urn:microsoft.com/office/officeart/2005/8/layout/matrix1"/>
+    <dgm:cxn modelId="{CE1BFC2F-C272-401B-87E2-E05756A27B9C}" srcId="{A6377181-3A36-4C51-A15D-4B7E94D00FA0}" destId="{1237DFD6-0265-4E66-87D0-86B251C30F0D}" srcOrd="1" destOrd="0" parTransId="{AD44DB8C-9398-4284-9B8F-BC0BC0895AA2}" sibTransId="{4DCC079E-582B-4059-AB4A-415843641298}"/>
+    <dgm:cxn modelId="{CA9A919A-66B6-4542-8228-D95EA9625F06}" srcId="{A6377181-3A36-4C51-A15D-4B7E94D00FA0}" destId="{1CDE512A-6BED-45E4-A160-0C3D6737D9F3}" srcOrd="0" destOrd="0" parTransId="{D2D956A1-F132-4E34-9C9F-D6B6A2CC28C6}" sibTransId="{0C71C6E2-B4A5-4BDC-8B9E-77BC354B0E92}"/>
+    <dgm:cxn modelId="{90BBF9A3-CC41-4939-A892-B7E889B2D478}" type="presOf" srcId="{30587BAF-AF05-4828-A149-C6184679BAE9}" destId="{D7398AA2-DA78-44BD-9312-E54896AB840C}" srcOrd="1" destOrd="0" presId="urn:microsoft.com/office/officeart/2005/8/layout/matrix1"/>
+    <dgm:cxn modelId="{9A0A9541-BA3C-420C-B1E6-43C3472B4448}" srcId="{A6377181-3A36-4C51-A15D-4B7E94D00FA0}" destId="{30587BAF-AF05-4828-A149-C6184679BAE9}" srcOrd="3" destOrd="0" parTransId="{0B723C7D-3193-45B3-B806-8F44C2C7ECAA}" sibTransId="{40355892-DDB1-4A68-9B6B-A685C949B489}"/>
+    <dgm:cxn modelId="{AC54CCC5-8AA3-495E-8E0B-7B66AB2F1266}" srcId="{A6377181-3A36-4C51-A15D-4B7E94D00FA0}" destId="{EB4AF810-5F27-4424-953F-6E745857D154}" srcOrd="2" destOrd="0" parTransId="{6C3A6F00-ECE5-4EB5-9CFD-DE68753BA39C}" sibTransId="{AB52290C-57D2-4F92-96DC-FE8CF16B276C}"/>
+    <dgm:cxn modelId="{62EF817D-6AAE-4D48-A2D7-A18B025313B2}" type="presOf" srcId="{1237DFD6-0265-4E66-87D0-86B251C30F0D}" destId="{444C665F-3054-43A4-943C-EE857BB99496}" srcOrd="1" destOrd="0" presId="urn:microsoft.com/office/officeart/2005/8/layout/matrix1"/>
+    <dgm:cxn modelId="{0ED3363E-5D62-4312-A318-53C0BA116D01}" type="presOf" srcId="{30587BAF-AF05-4828-A149-C6184679BAE9}" destId="{09449C3A-45BE-414E-816E-DC2893A628A2}" srcOrd="0" destOrd="0" presId="urn:microsoft.com/office/officeart/2005/8/layout/matrix1"/>
     <dgm:cxn modelId="{658114F4-81BF-4EDD-8380-5F7247E13437}" type="presOf" srcId="{A9390F88-A7A7-4C4D-89FF-1A78BBC8603B}" destId="{A5B61E79-E8F7-4B7A-B905-512B68224131}" srcOrd="0" destOrd="0" presId="urn:microsoft.com/office/officeart/2005/8/layout/matrix1"/>
-    <dgm:cxn modelId="{CA9A919A-66B6-4542-8228-D95EA9625F06}" srcId="{A6377181-3A36-4C51-A15D-4B7E94D00FA0}" destId="{1CDE512A-6BED-45E4-A160-0C3D6737D9F3}" srcOrd="0" destOrd="0" parTransId="{D2D956A1-F132-4E34-9C9F-D6B6A2CC28C6}" sibTransId="{0C71C6E2-B4A5-4BDC-8B9E-77BC354B0E92}"/>
-    <dgm:cxn modelId="{40777F0C-AFD2-4CCE-8AEA-864EECC35E15}" type="presOf" srcId="{EB4AF810-5F27-4424-953F-6E745857D154}" destId="{D2FE0942-737C-40CE-B352-72439F8F9C68}" srcOrd="0" destOrd="0" presId="urn:microsoft.com/office/officeart/2005/8/layout/matrix1"/>
-    <dgm:cxn modelId="{23D60C62-1061-4D8C-A1D3-653B6F882282}" type="presOf" srcId="{1CDE512A-6BED-45E4-A160-0C3D6737D9F3}" destId="{9A1B30D4-02A5-4672-9C99-D97316359BFB}" srcOrd="1" destOrd="0" presId="urn:microsoft.com/office/officeart/2005/8/layout/matrix1"/>
-    <dgm:cxn modelId="{B23B4867-79B3-4075-8926-88BA0545E3D3}" srcId="{A9390F88-A7A7-4C4D-89FF-1A78BBC8603B}" destId="{A6377181-3A36-4C51-A15D-4B7E94D00FA0}" srcOrd="0" destOrd="0" parTransId="{84154685-CCE4-4874-9D3E-EC906AA33513}" sibTransId="{6834B7DA-C6E1-42C8-9CF6-DC8897E558A9}"/>
-    <dgm:cxn modelId="{AC54CCC5-8AA3-495E-8E0B-7B66AB2F1266}" srcId="{A6377181-3A36-4C51-A15D-4B7E94D00FA0}" destId="{EB4AF810-5F27-4424-953F-6E745857D154}" srcOrd="2" destOrd="0" parTransId="{6C3A6F00-ECE5-4EB5-9CFD-DE68753BA39C}" sibTransId="{AB52290C-57D2-4F92-96DC-FE8CF16B276C}"/>
-    <dgm:cxn modelId="{8D7CEFE0-90DB-4DCD-95CB-3BE1994B98A0}" type="presOf" srcId="{A6377181-3A36-4C51-A15D-4B7E94D00FA0}" destId="{96227F7B-7EDE-413C-8E0D-D3C68CB157D4}" srcOrd="0" destOrd="0" presId="urn:microsoft.com/office/officeart/2005/8/layout/matrix1"/>
-    <dgm:cxn modelId="{62EF817D-6AAE-4D48-A2D7-A18B025313B2}" type="presOf" srcId="{1237DFD6-0265-4E66-87D0-86B251C30F0D}" destId="{444C665F-3054-43A4-943C-EE857BB99496}" srcOrd="1" destOrd="0" presId="urn:microsoft.com/office/officeart/2005/8/layout/matrix1"/>
-    <dgm:cxn modelId="{45D4AB65-1C40-4572-AD23-59C006F8BBBE}" type="presOf" srcId="{1CDE512A-6BED-45E4-A160-0C3D6737D9F3}" destId="{80A4CC39-7938-4EBF-BDB4-2D9237597EDA}" srcOrd="0" destOrd="0" presId="urn:microsoft.com/office/officeart/2005/8/layout/matrix1"/>
-    <dgm:cxn modelId="{156A6987-62C9-4821-9DCD-8227ECD93749}" type="presOf" srcId="{1237DFD6-0265-4E66-87D0-86B251C30F0D}" destId="{7C3AC0F8-C2A8-4D6A-B303-DFE85396908E}" srcOrd="0" destOrd="0" presId="urn:microsoft.com/office/officeart/2005/8/layout/matrix1"/>
-    <dgm:cxn modelId="{CE1BFC2F-C272-401B-87E2-E05756A27B9C}" srcId="{A6377181-3A36-4C51-A15D-4B7E94D00FA0}" destId="{1237DFD6-0265-4E66-87D0-86B251C30F0D}" srcOrd="1" destOrd="0" parTransId="{AD44DB8C-9398-4284-9B8F-BC0BC0895AA2}" sibTransId="{4DCC079E-582B-4059-AB4A-415843641298}"/>
-    <dgm:cxn modelId="{90BBF9A3-CC41-4939-A892-B7E889B2D478}" type="presOf" srcId="{30587BAF-AF05-4828-A149-C6184679BAE9}" destId="{D7398AA2-DA78-44BD-9312-E54896AB840C}" srcOrd="1" destOrd="0" presId="urn:microsoft.com/office/officeart/2005/8/layout/matrix1"/>
-    <dgm:cxn modelId="{0ED3363E-5D62-4312-A318-53C0BA116D01}" type="presOf" srcId="{30587BAF-AF05-4828-A149-C6184679BAE9}" destId="{09449C3A-45BE-414E-816E-DC2893A628A2}" srcOrd="0" destOrd="0" presId="urn:microsoft.com/office/officeart/2005/8/layout/matrix1"/>
-    <dgm:cxn modelId="{9A0A9541-BA3C-420C-B1E6-43C3472B4448}" srcId="{A6377181-3A36-4C51-A15D-4B7E94D00FA0}" destId="{30587BAF-AF05-4828-A149-C6184679BAE9}" srcOrd="3" destOrd="0" parTransId="{0B723C7D-3193-45B3-B806-8F44C2C7ECAA}" sibTransId="{40355892-DDB1-4A68-9B6B-A685C949B489}"/>
     <dgm:cxn modelId="{33EF4A35-0E69-4B32-9EBF-8E2DB3A4293B}" type="presParOf" srcId="{A5B61E79-E8F7-4B7A-B905-512B68224131}" destId="{CC4BDF31-B3C6-435B-A78E-ECD04F5785E6}" srcOrd="0" destOrd="0" presId="urn:microsoft.com/office/officeart/2005/8/layout/matrix1"/>
     <dgm:cxn modelId="{6C32DB93-BDC0-4087-B4FD-2F854223110E}" type="presParOf" srcId="{CC4BDF31-B3C6-435B-A78E-ECD04F5785E6}" destId="{80A4CC39-7938-4EBF-BDB4-2D9237597EDA}" srcOrd="0" destOrd="0" presId="urn:microsoft.com/office/officeart/2005/8/layout/matrix1"/>
     <dgm:cxn modelId="{CF6961DE-EAEB-4F9D-BDF0-8F1AA1D2B6AD}" type="presParOf" srcId="{CC4BDF31-B3C6-435B-A78E-ECD04F5785E6}" destId="{9A1B30D4-02A5-4672-9C99-D97316359BFB}" srcOrd="1" destOrd="0" presId="urn:microsoft.com/office/officeart/2005/8/layout/matrix1"/>
@@ -3025,7 +3035,7 @@
               <a:latin typeface="Helvetica" panose="020B0604020202020204" pitchFamily="34" charset="0"/>
               <a:cs typeface="Helvetica" panose="020B0604020202020204" pitchFamily="34" charset="0"/>
             </a:rPr>
-            <a:t>Listendarstellung aller Abhängigkeiten mit </a:t>
+            <a:t>Listendarstellung der Abhängigkeiten mit </a:t>
           </a:r>
           <a:r>
             <a:rPr lang="de-DE" b="1" dirty="0" err="1" smtClean="0">
@@ -3537,7 +3547,7 @@
               <a:latin typeface="Helvetica" panose="020B0604020202020204" pitchFamily="34" charset="0"/>
               <a:cs typeface="Helvetica" panose="020B0604020202020204" pitchFamily="34" charset="0"/>
             </a:rPr>
-            <a:t>Listendarstellung aller Abhängigkeiten mit </a:t>
+            <a:t>Listendarstellung der Abhängigkeiten mit </a:t>
           </a:r>
           <a:r>
             <a:rPr lang="de-DE" b="1" dirty="0" err="1" smtClean="0">
@@ -4077,7 +4087,17 @@
               <a:latin typeface="Helvetica" panose="020B0604020202020204" pitchFamily="34" charset="0"/>
               <a:cs typeface="Helvetica" panose="020B0604020202020204" pitchFamily="34" charset="0"/>
             </a:rPr>
-            <a:t>Listendarstellung aller Abhängigkeiten mit </a:t>
+            <a:t>Listendarstellung der </a:t>
+          </a:r>
+          <a:r>
+            <a:rPr lang="de-DE" sz="1600" b="1" kern="1200" dirty="0" smtClean="0">
+              <a:solidFill>
+                <a:schemeClr val="bg1"/>
+              </a:solidFill>
+              <a:latin typeface="Helvetica" panose="020B0604020202020204" pitchFamily="34" charset="0"/>
+              <a:cs typeface="Helvetica" panose="020B0604020202020204" pitchFamily="34" charset="0"/>
+            </a:rPr>
+            <a:t>Abhängigkeiten mit </a:t>
           </a:r>
           <a:r>
             <a:rPr lang="de-DE" sz="1600" b="1" kern="1200" dirty="0" err="1" smtClean="0">
@@ -4555,7 +4575,7 @@
               <a:latin typeface="Helvetica" panose="020B0604020202020204" pitchFamily="34" charset="0"/>
               <a:cs typeface="Helvetica" panose="020B0604020202020204" pitchFamily="34" charset="0"/>
             </a:rPr>
-            <a:t>Listendarstellung aller Abhängigkeiten mit </a:t>
+            <a:t>Listendarstellung der Abhängigkeiten mit </a:t>
           </a:r>
           <a:r>
             <a:rPr lang="de-DE" sz="1700" b="1" kern="1200" dirty="0" err="1" smtClean="0">
@@ -5029,7 +5049,7 @@
               <a:latin typeface="Helvetica" panose="020B0604020202020204" pitchFamily="34" charset="0"/>
               <a:cs typeface="Helvetica" panose="020B0604020202020204" pitchFamily="34" charset="0"/>
             </a:rPr>
-            <a:t>Listendarstellung aller Abhängigkeiten mit </a:t>
+            <a:t>Listendarstellung der Abhängigkeiten mit </a:t>
           </a:r>
           <a:r>
             <a:rPr lang="de-DE" sz="1700" b="1" kern="1200" dirty="0" err="1" smtClean="0">
@@ -14504,19 +14524,7 @@
                 <a:latin typeface="Helvetica" panose="020B0604020202020204" pitchFamily="34" charset="0"/>
                 <a:cs typeface="Helvetica" panose="020B0604020202020204" pitchFamily="34" charset="0"/>
               </a:rPr>
-              <a:t>4. Einblick Umsetzung </a:t>
-            </a:r>
-            <a:r>
-              <a:rPr lang="de-DE" sz="2000" b="1" dirty="0" smtClean="0">
-                <a:solidFill>
-                  <a:schemeClr val="bg1">
-                    <a:lumMod val="65000"/>
-                  </a:schemeClr>
-                </a:solidFill>
-                <a:latin typeface="Helvetica" panose="020B0604020202020204" pitchFamily="34" charset="0"/>
-                <a:cs typeface="Helvetica" panose="020B0604020202020204" pitchFamily="34" charset="0"/>
-              </a:rPr>
-              <a:t>– Grundlagen Maven Plugin</a:t>
+              <a:t>4. Einblick Umsetzung – Grundlagen Maven Plugin</a:t>
             </a:r>
             <a:endParaRPr lang="de-DE" sz="2000" b="1" dirty="0">
               <a:solidFill>
@@ -14903,19 +14911,7 @@
                 <a:latin typeface="Helvetica" panose="020B0604020202020204" pitchFamily="34" charset="0"/>
                 <a:cs typeface="Helvetica" panose="020B0604020202020204" pitchFamily="34" charset="0"/>
               </a:rPr>
-              <a:t>4. Einblick Umsetzung </a:t>
-            </a:r>
-            <a:r>
-              <a:rPr lang="de-DE" sz="2000" b="1" dirty="0" smtClean="0">
-                <a:solidFill>
-                  <a:schemeClr val="bg1">
-                    <a:lumMod val="65000"/>
-                  </a:schemeClr>
-                </a:solidFill>
-                <a:latin typeface="Helvetica" panose="020B0604020202020204" pitchFamily="34" charset="0"/>
-                <a:cs typeface="Helvetica" panose="020B0604020202020204" pitchFamily="34" charset="0"/>
-              </a:rPr>
-              <a:t>– Grobes Vorgehen</a:t>
+              <a:t>4. Einblick Umsetzung – Grobes Vorgehen</a:t>
             </a:r>
             <a:endParaRPr lang="de-DE" sz="2000" b="1" dirty="0">
               <a:solidFill>
@@ -15888,10 +15884,6 @@
               </a:rPr>
               <a:t>-Bibliothek von Eclipse</a:t>
             </a:r>
-            <a:endParaRPr lang="de-DE" sz="1400" dirty="0">
-              <a:latin typeface="Helvetica" panose="020B0604020202020204" pitchFamily="34" charset="0"/>
-              <a:cs typeface="Helvetica" panose="020B0604020202020204" pitchFamily="34" charset="0"/>
-            </a:endParaRPr>
           </a:p>
         </p:txBody>
       </p:sp>
@@ -17265,19 +17257,7 @@
                 <a:latin typeface="Helvetica" panose="020B0604020202020204" pitchFamily="34" charset="0"/>
                 <a:cs typeface="Helvetica" panose="020B0604020202020204" pitchFamily="34" charset="0"/>
               </a:rPr>
-              <a:t>4. Einblick Umsetzung </a:t>
-            </a:r>
-            <a:r>
-              <a:rPr lang="de-DE" sz="2000" b="1" dirty="0" smtClean="0">
-                <a:solidFill>
-                  <a:schemeClr val="bg1">
-                    <a:lumMod val="65000"/>
-                  </a:schemeClr>
-                </a:solidFill>
-                <a:latin typeface="Helvetica" panose="020B0604020202020204" pitchFamily="34" charset="0"/>
-                <a:cs typeface="Helvetica" panose="020B0604020202020204" pitchFamily="34" charset="0"/>
-              </a:rPr>
-              <a:t>– Grobes Vorgehen</a:t>
+              <a:t>4. Einblick Umsetzung – Grobes Vorgehen</a:t>
             </a:r>
             <a:endParaRPr lang="de-DE" sz="2000" b="1" dirty="0">
               <a:solidFill>
@@ -20427,7 +20407,7 @@
           <p:nvPr>
             <p:extLst>
               <p:ext uri="{D42A27DB-BD31-4B8C-83A1-F6EECF244321}">
-                <p14:modId xmlns:p14="http://schemas.microsoft.com/office/powerpoint/2010/main" val="469928887"/>
+                <p14:modId xmlns:p14="http://schemas.microsoft.com/office/powerpoint/2010/main" val="3449837164"/>
               </p:ext>
             </p:extLst>
           </p:nvPr>
@@ -20581,7 +20561,7 @@
           <p:nvPr>
             <p:extLst>
               <p:ext uri="{D42A27DB-BD31-4B8C-83A1-F6EECF244321}">
-                <p14:modId xmlns:p14="http://schemas.microsoft.com/office/powerpoint/2010/main" val="287234151"/>
+                <p14:modId xmlns:p14="http://schemas.microsoft.com/office/powerpoint/2010/main" val="73338916"/>
               </p:ext>
             </p:extLst>
           </p:nvPr>
@@ -24681,7 +24661,7 @@
           <p:nvPr>
             <p:extLst>
               <p:ext uri="{D42A27DB-BD31-4B8C-83A1-F6EECF244321}">
-                <p14:modId xmlns:p14="http://schemas.microsoft.com/office/powerpoint/2010/main" val="235309147"/>
+                <p14:modId xmlns:p14="http://schemas.microsoft.com/office/powerpoint/2010/main" val="3079650613"/>
               </p:ext>
             </p:extLst>
           </p:nvPr>

</xml_diff>